<commit_message>
add ranvar-expect-total.pptx, edit all the expectation slides
</commit_message>
<xml_diff>
--- a/spring13/slides13/ranvar-expect-heads.pptx
+++ b/spring13/slides13/ranvar-expect-heads.pptx
@@ -13,14 +13,14 @@
   <p:sldIdLst>
     <p:sldId id="302" r:id="rId2"/>
     <p:sldId id="303" r:id="rId3"/>
-    <p:sldId id="364" r:id="rId4"/>
-    <p:sldId id="362" r:id="rId5"/>
-    <p:sldId id="325" r:id="rId6"/>
-    <p:sldId id="370" r:id="rId7"/>
-    <p:sldId id="371" r:id="rId8"/>
-    <p:sldId id="326" r:id="rId9"/>
-    <p:sldId id="327" r:id="rId10"/>
-    <p:sldId id="372" r:id="rId11"/>
+    <p:sldId id="374" r:id="rId4"/>
+    <p:sldId id="375" r:id="rId5"/>
+    <p:sldId id="376" r:id="rId6"/>
+    <p:sldId id="371" r:id="rId7"/>
+    <p:sldId id="326" r:id="rId8"/>
+    <p:sldId id="327" r:id="rId9"/>
+    <p:sldId id="372" r:id="rId10"/>
+    <p:sldId id="377" r:id="rId11"/>
     <p:sldId id="373" r:id="rId12"/>
     <p:sldId id="331" r:id="rId13"/>
     <p:sldId id="332" r:id="rId14"/>
@@ -1478,68 +1478,63 @@
       </p:grpSpPr>
       <p:sp>
         <p:nvSpPr>
-          <p:cNvPr id="71682" name="Rectangle 7"/>
+          <p:cNvPr id="2" name="Slide Image Placeholder 1"/>
           <p:cNvSpPr>
-            <a:spLocks noGrp="1" noChangeArrowheads="1"/>
+            <a:spLocks noGrp="1" noRot="1" noChangeAspect="1"/>
           </p:cNvSpPr>
           <p:nvPr>
-            <p:ph type="sldNum" sz="quarter" idx="5"/>
-          </p:nvPr>
-        </p:nvSpPr>
-        <p:spPr>
-          <a:noFill/>
-        </p:spPr>
+            <p:ph type="sldImg"/>
+          </p:nvPr>
+        </p:nvSpPr>
+        <p:spPr/>
+      </p:sp>
+      <p:sp>
+        <p:nvSpPr>
+          <p:cNvPr id="3" name="Notes Placeholder 2"/>
+          <p:cNvSpPr>
+            <a:spLocks noGrp="1"/>
+          </p:cNvSpPr>
+          <p:nvPr>
+            <p:ph type="body" idx="1"/>
+          </p:nvPr>
+        </p:nvSpPr>
+        <p:spPr/>
+        <p:txBody>
+          <a:bodyPr>
+            <a:normAutofit/>
+          </a:bodyPr>
+          <a:lstStyle/>
+          <a:p>
+            <a:endParaRPr lang="en-US"/>
+          </a:p>
+        </p:txBody>
+      </p:sp>
+      <p:sp>
+        <p:nvSpPr>
+          <p:cNvPr id="4" name="Slide Number Placeholder 3"/>
+          <p:cNvSpPr>
+            <a:spLocks noGrp="1"/>
+          </p:cNvSpPr>
+          <p:nvPr>
+            <p:ph type="sldNum" sz="quarter" idx="10"/>
+          </p:nvPr>
+        </p:nvSpPr>
+        <p:spPr/>
         <p:txBody>
           <a:bodyPr/>
           <a:lstStyle/>
           <a:p>
-            <a:fld id="{B2071B43-808F-4048-B1A6-DC5CBB081F20}" type="slidenum">
+            <a:pPr>
+              <a:defRPr/>
+            </a:pPr>
+            <a:fld id="{95AA6155-33F1-4AB1-B9CE-6460C2E01BD9}" type="slidenum">
               <a:rPr lang="en-US" smtClean="0"/>
-              <a:pPr/>
+              <a:pPr>
+                <a:defRPr/>
+              </a:pPr>
               <a:t>3</a:t>
             </a:fld>
-            <a:endParaRPr lang="en-US" smtClean="0"/>
-          </a:p>
-        </p:txBody>
-      </p:sp>
-      <p:sp>
-        <p:nvSpPr>
-          <p:cNvPr id="71683" name="Rectangle 2"/>
-          <p:cNvSpPr>
-            <a:spLocks noGrp="1" noRot="1" noChangeAspect="1" noChangeArrowheads="1" noTextEdit="1"/>
-          </p:cNvSpPr>
-          <p:nvPr>
-            <p:ph type="sldImg"/>
-          </p:nvPr>
-        </p:nvSpPr>
-        <p:spPr>
-          <a:xfrm>
-            <a:off x="2973388" y="549275"/>
-            <a:ext cx="3659187" cy="2743200"/>
-          </a:xfrm>
-          <a:ln/>
-        </p:spPr>
-      </p:sp>
-      <p:sp>
-        <p:nvSpPr>
-          <p:cNvPr id="71684" name="Rectangle 3"/>
-          <p:cNvSpPr>
-            <a:spLocks noGrp="1" noChangeArrowheads="1"/>
-          </p:cNvSpPr>
-          <p:nvPr>
-            <p:ph type="body" idx="1"/>
-          </p:nvPr>
-        </p:nvSpPr>
-        <p:spPr>
-          <a:noFill/>
-          <a:ln/>
-        </p:spPr>
-        <p:txBody>
-          <a:bodyPr/>
-          <a:lstStyle/>
-          <a:p>
-            <a:pPr eaLnBrk="1" hangingPunct="1"/>
-            <a:endParaRPr lang="en-US" smtClean="0"/>
+            <a:endParaRPr lang="en-US"/>
           </a:p>
         </p:txBody>
       </p:sp>
@@ -2858,22 +2853,7 @@
                 <a:uFillTx/>
                 <a:latin typeface="Comic Sans MS" pitchFamily="66" charset="0"/>
               </a:rPr>
-              <a:t>Albert R Meyer,            May </a:t>
-            </a:r>
-            <a:r>
-              <a:rPr kumimoji="0" lang="en-US" sz="1200" b="0" i="0" u="none" strike="noStrike" kern="1200" cap="none" spc="0" normalizeH="0" baseline="0" noProof="0" dirty="0" smtClean="0">
-                <a:ln>
-                  <a:noFill/>
-                </a:ln>
-                <a:solidFill>
-                  <a:schemeClr val="tx1"/>
-                </a:solidFill>
-                <a:effectLst/>
-                <a:uLnTx/>
-                <a:uFillTx/>
-                <a:latin typeface="Comic Sans MS" pitchFamily="66" charset="0"/>
-              </a:rPr>
-              <a:t>8, 2013</a:t>
+              <a:t>Albert R Meyer,            May 8, 2013</a:t>
             </a:r>
             <a:endParaRPr kumimoji="0" lang="en-US" sz="1200" b="0" i="0" u="none" strike="noStrike" kern="1200" cap="none" spc="0" normalizeH="0" baseline="0" noProof="0" dirty="0">
               <a:ln>
@@ -3552,261 +3532,7 @@
           <p:nvPr>
             <p:extLst>
               <p:ext uri="{D42A27DB-BD31-4B8C-83A1-F6EECF244321}">
-                <p14:modId xmlns:p14="http://schemas.microsoft.com/office/powerpoint/2010/main" val="3866746812"/>
-              </p:ext>
-            </p:extLst>
-          </p:nvPr>
-        </p:nvGraphicFramePr>
-        <p:xfrm>
-          <a:off x="1273140" y="1023239"/>
-          <a:ext cx="6557224" cy="1913883"/>
-        </p:xfrm>
-        <a:graphic>
-          <a:graphicData uri="http://schemas.openxmlformats.org/presentationml/2006/ole">
-            <mc:AlternateContent xmlns:mc="http://schemas.openxmlformats.org/markup-compatibility/2006">
-              <mc:Choice xmlns:v="urn:schemas-microsoft-com:vml" Requires="v">
-                <p:oleObj spid="_x0000_s583715" name="Equation" r:id="rId4" imgW="1739880" imgH="507960" progId="Equation.DSMT4">
-                  <p:embed/>
-                </p:oleObj>
-              </mc:Choice>
-              <mc:Fallback>
-                <p:oleObj name="Equation" r:id="rId4" imgW="1739880" imgH="507960" progId="Equation.DSMT4">
-                  <p:embed/>
-                  <p:pic>
-                    <p:nvPicPr>
-                      <p:cNvPr id="0" name=""/>
-                      <p:cNvPicPr>
-                        <a:picLocks noChangeAspect="1" noChangeArrowheads="1"/>
-                      </p:cNvPicPr>
-                      <p:nvPr/>
-                    </p:nvPicPr>
-                    <p:blipFill>
-                      <a:blip r:embed="rId5">
-                        <a:extLst>
-                          <a:ext uri="{28A0092B-C50C-407E-A947-70E740481C1C}">
-                            <a14:useLocalDpi xmlns:a14="http://schemas.microsoft.com/office/drawing/2010/main" val="0"/>
-                          </a:ext>
-                        </a:extLst>
-                      </a:blip>
-                      <a:srcRect/>
-                      <a:stretch>
-                        <a:fillRect/>
-                      </a:stretch>
-                    </p:blipFill>
-                    <p:spPr bwMode="auto">
-                      <a:xfrm>
-                        <a:off x="1273140" y="1023239"/>
-                        <a:ext cx="6557224" cy="1913883"/>
-                      </a:xfrm>
-                      <a:prstGeom prst="rect">
-                        <a:avLst/>
-                      </a:prstGeom>
-                      <a:noFill/>
-                      <a:extLst/>
-                    </p:spPr>
-                  </p:pic>
-                </p:oleObj>
-              </mc:Fallback>
-            </mc:AlternateContent>
-          </a:graphicData>
-        </a:graphic>
-      </p:graphicFrame>
-      <p:sp>
-        <p:nvSpPr>
-          <p:cNvPr id="4" name="Rectangle 2"/>
-          <p:cNvSpPr>
-            <a:spLocks noGrp="1" noChangeArrowheads="1"/>
-          </p:cNvSpPr>
-          <p:nvPr>
-            <p:ph type="title"/>
-          </p:nvPr>
-        </p:nvSpPr>
-        <p:spPr/>
-        <p:txBody>
-          <a:bodyPr/>
-          <a:lstStyle/>
-          <a:p>
-            <a:pPr eaLnBrk="1" hangingPunct="1"/>
-            <a:r>
-              <a:rPr lang="en-US" sz="4400" dirty="0" smtClean="0">
-                <a:solidFill>
-                  <a:schemeClr val="tx1"/>
-                </a:solidFill>
-              </a:rPr>
-              <a:t>Binomial Expectation</a:t>
-            </a:r>
-          </a:p>
-        </p:txBody>
-      </p:sp>
-      <p:graphicFrame>
-        <p:nvGraphicFramePr>
-          <p:cNvPr id="148484" name="Object 4"/>
-          <p:cNvGraphicFramePr>
-            <a:graphicFrameLocks noChangeAspect="1"/>
-          </p:cNvGraphicFramePr>
-          <p:nvPr>
-            <p:extLst>
-              <p:ext uri="{D42A27DB-BD31-4B8C-83A1-F6EECF244321}">
-                <p14:modId xmlns:p14="http://schemas.microsoft.com/office/powerpoint/2010/main" val="2506010673"/>
-              </p:ext>
-            </p:extLst>
-          </p:nvPr>
-        </p:nvGraphicFramePr>
-        <p:xfrm>
-          <a:off x="757470" y="3045715"/>
-          <a:ext cx="7096125" cy="1979613"/>
-        </p:xfrm>
-        <a:graphic>
-          <a:graphicData uri="http://schemas.openxmlformats.org/presentationml/2006/ole">
-            <mc:AlternateContent xmlns:mc="http://schemas.openxmlformats.org/markup-compatibility/2006">
-              <mc:Choice xmlns:v="urn:schemas-microsoft-com:vml" Requires="v">
-                <p:oleObj spid="_x0000_s583716" name="Equation" r:id="rId6" imgW="1866900" imgH="520700" progId="Equation.DSMT4">
-                  <p:embed/>
-                </p:oleObj>
-              </mc:Choice>
-              <mc:Fallback>
-                <p:oleObj name="Equation" r:id="rId6" imgW="1866900" imgH="520700" progId="Equation.DSMT4">
-                  <p:embed/>
-                  <p:pic>
-                    <p:nvPicPr>
-                      <p:cNvPr id="0" name=""/>
-                      <p:cNvPicPr>
-                        <a:picLocks noChangeAspect="1" noChangeArrowheads="1"/>
-                      </p:cNvPicPr>
-                      <p:nvPr/>
-                    </p:nvPicPr>
-                    <p:blipFill>
-                      <a:blip r:embed="rId7"/>
-                      <a:srcRect/>
-                      <a:stretch>
-                        <a:fillRect/>
-                      </a:stretch>
-                    </p:blipFill>
-                    <p:spPr bwMode="auto">
-                      <a:xfrm>
-                        <a:off x="757470" y="3045715"/>
-                        <a:ext cx="7096125" cy="1979613"/>
-                      </a:xfrm>
-                      <a:prstGeom prst="rect">
-                        <a:avLst/>
-                      </a:prstGeom>
-                      <a:noFill/>
-                      <a:extLst/>
-                    </p:spPr>
-                  </p:pic>
-                </p:oleObj>
-              </mc:Fallback>
-            </mc:AlternateContent>
-          </a:graphicData>
-        </a:graphic>
-      </p:graphicFrame>
-      <p:sp>
-        <p:nvSpPr>
-          <p:cNvPr id="6" name="Slide Number Placeholder 3"/>
-          <p:cNvSpPr>
-            <a:spLocks noGrp="1"/>
-          </p:cNvSpPr>
-          <p:nvPr>
-            <p:ph type="sldNum" sz="quarter" idx="4294967295"/>
-          </p:nvPr>
-        </p:nvSpPr>
-        <p:spPr>
-          <a:xfrm>
-            <a:off x="7554913" y="6577965"/>
-            <a:ext cx="1527175" cy="244475"/>
-          </a:xfrm>
-          <a:prstGeom prst="rect">
-            <a:avLst/>
-          </a:prstGeom>
-        </p:spPr>
-        <p:txBody>
-          <a:bodyPr/>
-          <a:lstStyle/>
-          <a:p>
-            <a:pPr>
-              <a:defRPr/>
-            </a:pPr>
-            <a:r>
-              <a:rPr lang="en-US" sz="1200" dirty="0" err="1">
-                <a:latin typeface="Comic Sans MS"/>
-                <a:cs typeface="Comic Sans MS"/>
-              </a:rPr>
-              <a:t>lec</a:t>
-            </a:r>
-            <a:r>
-              <a:rPr lang="en-US" sz="1200" dirty="0" smtClean="0">
-                <a:latin typeface="Comic Sans MS"/>
-                <a:cs typeface="Comic Sans MS"/>
-              </a:rPr>
-              <a:t> 12F.</a:t>
-            </a:r>
-            <a:fld id="{93DA0692-DAF7-4AFE-9BE7-E02439D3694A}" type="slidenum">
-              <a:rPr lang="en-US" sz="1200" smtClean="0">
-                <a:latin typeface="Comic Sans MS"/>
-                <a:cs typeface="Comic Sans MS"/>
-              </a:rPr>
-              <a:pPr>
-                <a:defRPr/>
-              </a:pPr>
-              <a:t>10</a:t>
-            </a:fld>
-            <a:endParaRPr lang="en-US" sz="1200" dirty="0">
-              <a:latin typeface="Comic Sans MS"/>
-              <a:cs typeface="Comic Sans MS"/>
-            </a:endParaRPr>
-          </a:p>
-        </p:txBody>
-      </p:sp>
-    </p:spTree>
-    <p:extLst>
-      <p:ext uri="{BB962C8B-B14F-4D97-AF65-F5344CB8AC3E}">
-        <p14:creationId xmlns:p14="http://schemas.microsoft.com/office/powerpoint/2010/main" val="1450720977"/>
-      </p:ext>
-    </p:extLst>
-  </p:cSld>
-  <p:clrMapOvr>
-    <a:masterClrMapping/>
-  </p:clrMapOvr>
-  <p:transition xmlns:p14="http://schemas.microsoft.com/office/powerpoint/2010/main">
-    <p:fade/>
-  </p:transition>
-  <p:timing>
-    <p:tnLst>
-      <p:par>
-        <p:cTn xmlns:p14="http://schemas.microsoft.com/office/powerpoint/2010/main" id="1" dur="indefinite" restart="never" nodeType="tmRoot"/>
-      </p:par>
-    </p:tnLst>
-  </p:timing>
-</p:sld>
-</file>
-
-<file path=ppt/slides/slide11.xml><?xml version="1.0" encoding="utf-8"?>
-<p:sld xmlns:a="http://schemas.openxmlformats.org/drawingml/2006/main" xmlns:r="http://schemas.openxmlformats.org/officeDocument/2006/relationships" xmlns:p="http://schemas.openxmlformats.org/presentationml/2006/main">
-  <p:cSld>
-    <p:spTree>
-      <p:nvGrpSpPr>
-        <p:cNvPr id="1" name=""/>
-        <p:cNvGrpSpPr/>
-        <p:nvPr/>
-      </p:nvGrpSpPr>
-      <p:grpSpPr>
-        <a:xfrm>
-          <a:off x="0" y="0"/>
-          <a:ext cx="0" cy="0"/>
-          <a:chOff x="0" y="0"/>
-          <a:chExt cx="0" cy="0"/>
-        </a:xfrm>
-      </p:grpSpPr>
-      <p:graphicFrame>
-        <p:nvGraphicFramePr>
-          <p:cNvPr id="5" name="Object 4"/>
-          <p:cNvGraphicFramePr>
-            <a:graphicFrameLocks noChangeAspect="1"/>
-          </p:cNvGraphicFramePr>
-          <p:nvPr>
-            <p:extLst>
-              <p:ext uri="{D42A27DB-BD31-4B8C-83A1-F6EECF244321}">
-                <p14:modId xmlns:p14="http://schemas.microsoft.com/office/powerpoint/2010/main" val="1572504059"/>
+                <p14:modId xmlns:p14="http://schemas.microsoft.com/office/powerpoint/2010/main" val="4123960337"/>
               </p:ext>
             </p:extLst>
           </p:nvPr>
@@ -3819,7 +3545,7 @@
           <a:graphicData uri="http://schemas.openxmlformats.org/presentationml/2006/ole">
             <mc:AlternateContent xmlns:mc="http://schemas.openxmlformats.org/markup-compatibility/2006">
               <mc:Choice xmlns:v="urn:schemas-microsoft-com:vml" Requires="v">
-                <p:oleObj spid="_x0000_s584758" name="Equation" r:id="rId4" imgW="1739880" imgH="507960" progId="Equation.DSMT4">
+                <p:oleObj spid="_x0000_s588810" name="Equation" r:id="rId4" imgW="1739880" imgH="507960" progId="Equation.DSMT4">
                   <p:embed/>
                 </p:oleObj>
               </mc:Choice>
@@ -3901,7 +3627,7 @@
           <p:nvPr>
             <p:extLst>
               <p:ext uri="{D42A27DB-BD31-4B8C-83A1-F6EECF244321}">
-                <p14:modId xmlns:p14="http://schemas.microsoft.com/office/powerpoint/2010/main" val="350230335"/>
+                <p14:modId xmlns:p14="http://schemas.microsoft.com/office/powerpoint/2010/main" val="2700232331"/>
               </p:ext>
             </p:extLst>
           </p:nvPr>
@@ -3914,7 +3640,7 @@
           <a:graphicData uri="http://schemas.openxmlformats.org/presentationml/2006/ole">
             <mc:AlternateContent xmlns:mc="http://schemas.openxmlformats.org/markup-compatibility/2006">
               <mc:Choice xmlns:v="urn:schemas-microsoft-com:vml" Requires="v">
-                <p:oleObj spid="_x0000_s584759" name="Equation" r:id="rId6" imgW="1600200" imgH="520700" progId="Equation.DSMT4">
+                <p:oleObj spid="_x0000_s588811" name="Equation" r:id="rId6" imgW="1600200" imgH="520700" progId="Equation.DSMT4">
                   <p:embed/>
                 </p:oleObj>
               </mc:Choice>
@@ -4002,6 +3728,260 @@
               <a:pPr>
                 <a:defRPr/>
               </a:pPr>
+              <a:t>10</a:t>
+            </a:fld>
+            <a:endParaRPr lang="en-US" sz="1200" dirty="0">
+              <a:latin typeface="Comic Sans MS"/>
+              <a:cs typeface="Comic Sans MS"/>
+            </a:endParaRPr>
+          </a:p>
+        </p:txBody>
+      </p:sp>
+    </p:spTree>
+    <p:extLst>
+      <p:ext uri="{BB962C8B-B14F-4D97-AF65-F5344CB8AC3E}">
+        <p14:creationId xmlns:p14="http://schemas.microsoft.com/office/powerpoint/2010/main" val="3124705895"/>
+      </p:ext>
+    </p:extLst>
+  </p:cSld>
+  <p:clrMapOvr>
+    <a:masterClrMapping/>
+  </p:clrMapOvr>
+  <p:transition xmlns:p14="http://schemas.microsoft.com/office/powerpoint/2010/main">
+    <p:fade/>
+  </p:transition>
+  <p:timing>
+    <p:tnLst>
+      <p:par>
+        <p:cTn xmlns:p14="http://schemas.microsoft.com/office/powerpoint/2010/main" id="1" dur="indefinite" restart="never" nodeType="tmRoot"/>
+      </p:par>
+    </p:tnLst>
+  </p:timing>
+</p:sld>
+</file>
+
+<file path=ppt/slides/slide11.xml><?xml version="1.0" encoding="utf-8"?>
+<p:sld xmlns:a="http://schemas.openxmlformats.org/drawingml/2006/main" xmlns:r="http://schemas.openxmlformats.org/officeDocument/2006/relationships" xmlns:p="http://schemas.openxmlformats.org/presentationml/2006/main">
+  <p:cSld>
+    <p:spTree>
+      <p:nvGrpSpPr>
+        <p:cNvPr id="1" name=""/>
+        <p:cNvGrpSpPr/>
+        <p:nvPr/>
+      </p:nvGrpSpPr>
+      <p:grpSpPr>
+        <a:xfrm>
+          <a:off x="0" y="0"/>
+          <a:ext cx="0" cy="0"/>
+          <a:chOff x="0" y="0"/>
+          <a:chExt cx="0" cy="0"/>
+        </a:xfrm>
+      </p:grpSpPr>
+      <p:graphicFrame>
+        <p:nvGraphicFramePr>
+          <p:cNvPr id="5" name="Object 4"/>
+          <p:cNvGraphicFramePr>
+            <a:graphicFrameLocks noChangeAspect="1"/>
+          </p:cNvGraphicFramePr>
+          <p:nvPr>
+            <p:extLst>
+              <p:ext uri="{D42A27DB-BD31-4B8C-83A1-F6EECF244321}">
+                <p14:modId xmlns:p14="http://schemas.microsoft.com/office/powerpoint/2010/main" val="1572504059"/>
+              </p:ext>
+            </p:extLst>
+          </p:nvPr>
+        </p:nvGraphicFramePr>
+        <p:xfrm>
+          <a:off x="1273140" y="1034579"/>
+          <a:ext cx="6557224" cy="1913883"/>
+        </p:xfrm>
+        <a:graphic>
+          <a:graphicData uri="http://schemas.openxmlformats.org/presentationml/2006/ole">
+            <mc:AlternateContent xmlns:mc="http://schemas.openxmlformats.org/markup-compatibility/2006">
+              <mc:Choice xmlns:v="urn:schemas-microsoft-com:vml" Requires="v">
+                <p:oleObj spid="_x0000_s584784" name="Equation" r:id="rId4" imgW="1739880" imgH="507960" progId="Equation.DSMT4">
+                  <p:embed/>
+                </p:oleObj>
+              </mc:Choice>
+              <mc:Fallback>
+                <p:oleObj name="Equation" r:id="rId4" imgW="1739880" imgH="507960" progId="Equation.DSMT4">
+                  <p:embed/>
+                  <p:pic>
+                    <p:nvPicPr>
+                      <p:cNvPr id="0" name=""/>
+                      <p:cNvPicPr>
+                        <a:picLocks noChangeAspect="1" noChangeArrowheads="1"/>
+                      </p:cNvPicPr>
+                      <p:nvPr/>
+                    </p:nvPicPr>
+                    <p:blipFill>
+                      <a:blip r:embed="rId5">
+                        <a:extLst>
+                          <a:ext uri="{28A0092B-C50C-407E-A947-70E740481C1C}">
+                            <a14:useLocalDpi xmlns:a14="http://schemas.microsoft.com/office/drawing/2010/main" val="0"/>
+                          </a:ext>
+                        </a:extLst>
+                      </a:blip>
+                      <a:srcRect/>
+                      <a:stretch>
+                        <a:fillRect/>
+                      </a:stretch>
+                    </p:blipFill>
+                    <p:spPr bwMode="auto">
+                      <a:xfrm>
+                        <a:off x="1273140" y="1034579"/>
+                        <a:ext cx="6557224" cy="1913883"/>
+                      </a:xfrm>
+                      <a:prstGeom prst="rect">
+                        <a:avLst/>
+                      </a:prstGeom>
+                      <a:noFill/>
+                      <a:extLst/>
+                    </p:spPr>
+                  </p:pic>
+                </p:oleObj>
+              </mc:Fallback>
+            </mc:AlternateContent>
+          </a:graphicData>
+        </a:graphic>
+      </p:graphicFrame>
+      <p:sp>
+        <p:nvSpPr>
+          <p:cNvPr id="4" name="Rectangle 2"/>
+          <p:cNvSpPr>
+            <a:spLocks noGrp="1" noChangeArrowheads="1"/>
+          </p:cNvSpPr>
+          <p:nvPr>
+            <p:ph type="title"/>
+          </p:nvPr>
+        </p:nvSpPr>
+        <p:spPr/>
+        <p:txBody>
+          <a:bodyPr/>
+          <a:lstStyle/>
+          <a:p>
+            <a:pPr eaLnBrk="1" hangingPunct="1"/>
+            <a:r>
+              <a:rPr lang="en-US" sz="4400" dirty="0" smtClean="0">
+                <a:solidFill>
+                  <a:schemeClr val="tx1"/>
+                </a:solidFill>
+              </a:rPr>
+              <a:t>Binomial Expectation</a:t>
+            </a:r>
+          </a:p>
+        </p:txBody>
+      </p:sp>
+      <p:graphicFrame>
+        <p:nvGraphicFramePr>
+          <p:cNvPr id="148484" name="Object 4"/>
+          <p:cNvGraphicFramePr>
+            <a:graphicFrameLocks noChangeAspect="1"/>
+          </p:cNvGraphicFramePr>
+          <p:nvPr>
+            <p:extLst>
+              <p:ext uri="{D42A27DB-BD31-4B8C-83A1-F6EECF244321}">
+                <p14:modId xmlns:p14="http://schemas.microsoft.com/office/powerpoint/2010/main" val="2670270644"/>
+              </p:ext>
+            </p:extLst>
+          </p:nvPr>
+        </p:nvGraphicFramePr>
+        <p:xfrm>
+          <a:off x="1751213" y="3092678"/>
+          <a:ext cx="4537075" cy="1931987"/>
+        </p:xfrm>
+        <a:graphic>
+          <a:graphicData uri="http://schemas.openxmlformats.org/presentationml/2006/ole">
+            <mc:AlternateContent xmlns:mc="http://schemas.openxmlformats.org/markup-compatibility/2006">
+              <mc:Choice xmlns:v="urn:schemas-microsoft-com:vml" Requires="v">
+                <p:oleObj spid="_x0000_s584785" name="Equation" r:id="rId6" imgW="1193800" imgH="508000" progId="Equation.DSMT4">
+                  <p:embed/>
+                </p:oleObj>
+              </mc:Choice>
+              <mc:Fallback>
+                <p:oleObj name="Equation" r:id="rId6" imgW="1193800" imgH="508000" progId="Equation.DSMT4">
+                  <p:embed/>
+                  <p:pic>
+                    <p:nvPicPr>
+                      <p:cNvPr id="0" name=""/>
+                      <p:cNvPicPr>
+                        <a:picLocks noChangeAspect="1" noChangeArrowheads="1"/>
+                      </p:cNvPicPr>
+                      <p:nvPr/>
+                    </p:nvPicPr>
+                    <p:blipFill>
+                      <a:blip r:embed="rId7"/>
+                      <a:srcRect/>
+                      <a:stretch>
+                        <a:fillRect/>
+                      </a:stretch>
+                    </p:blipFill>
+                    <p:spPr bwMode="auto">
+                      <a:xfrm>
+                        <a:off x="1751213" y="3092678"/>
+                        <a:ext cx="4537075" cy="1931987"/>
+                      </a:xfrm>
+                      <a:prstGeom prst="rect">
+                        <a:avLst/>
+                      </a:prstGeom>
+                      <a:noFill/>
+                      <a:extLst/>
+                    </p:spPr>
+                  </p:pic>
+                </p:oleObj>
+              </mc:Fallback>
+            </mc:AlternateContent>
+          </a:graphicData>
+        </a:graphic>
+      </p:graphicFrame>
+      <p:sp>
+        <p:nvSpPr>
+          <p:cNvPr id="6" name="Slide Number Placeholder 3"/>
+          <p:cNvSpPr>
+            <a:spLocks noGrp="1"/>
+          </p:cNvSpPr>
+          <p:nvPr>
+            <p:ph type="sldNum" sz="quarter" idx="4294967295"/>
+          </p:nvPr>
+        </p:nvSpPr>
+        <p:spPr>
+          <a:xfrm>
+            <a:off x="7554913" y="6577965"/>
+            <a:ext cx="1527175" cy="244475"/>
+          </a:xfrm>
+          <a:prstGeom prst="rect">
+            <a:avLst/>
+          </a:prstGeom>
+        </p:spPr>
+        <p:txBody>
+          <a:bodyPr/>
+          <a:lstStyle/>
+          <a:p>
+            <a:pPr>
+              <a:defRPr/>
+            </a:pPr>
+            <a:r>
+              <a:rPr lang="en-US" sz="1200" dirty="0" err="1">
+                <a:latin typeface="Comic Sans MS"/>
+                <a:cs typeface="Comic Sans MS"/>
+              </a:rPr>
+              <a:t>lec</a:t>
+            </a:r>
+            <a:r>
+              <a:rPr lang="en-US" sz="1200" dirty="0" smtClean="0">
+                <a:latin typeface="Comic Sans MS"/>
+                <a:cs typeface="Comic Sans MS"/>
+              </a:rPr>
+              <a:t> 12F.</a:t>
+            </a:r>
+            <a:fld id="{93DA0692-DAF7-4AFE-9BE7-E02439D3694A}" type="slidenum">
+              <a:rPr lang="en-US" sz="1200" smtClean="0">
+                <a:latin typeface="Comic Sans MS"/>
+                <a:cs typeface="Comic Sans MS"/>
+              </a:rPr>
+              <a:pPr>
+                <a:defRPr/>
+              </a:pPr>
               <a:t>11</a:t>
             </a:fld>
             <a:endParaRPr lang="en-US" sz="1200" dirty="0">
@@ -4020,7 +4000,7 @@
           <p:nvPr>
             <p:extLst>
               <p:ext uri="{D42A27DB-BD31-4B8C-83A1-F6EECF244321}">
-                <p14:modId xmlns:p14="http://schemas.microsoft.com/office/powerpoint/2010/main" val="2675471893"/>
+                <p14:modId xmlns:p14="http://schemas.microsoft.com/office/powerpoint/2010/main" val="1610459782"/>
               </p:ext>
             </p:extLst>
           </p:nvPr>
@@ -4033,7 +4013,7 @@
           <a:graphicData uri="http://schemas.openxmlformats.org/presentationml/2006/ole">
             <mc:AlternateContent xmlns:mc="http://schemas.openxmlformats.org/markup-compatibility/2006">
               <mc:Choice xmlns:v="urn:schemas-microsoft-com:vml" Requires="v">
-                <p:oleObj spid="_x0000_s584760" name="Equation" r:id="rId8" imgW="850900" imgH="355600" progId="Equation.DSMT4">
+                <p:oleObj spid="_x0000_s584786" name="Equation" r:id="rId8" imgW="850900" imgH="355600" progId="Equation.DSMT4">
                   <p:embed/>
                 </p:oleObj>
               </mc:Choice>
@@ -4269,7 +4249,7 @@
 </file>
 
 <file path=ppt/slides/slide12.xml><?xml version="1.0" encoding="utf-8"?>
-<p:sld xmlns:a="http://schemas.openxmlformats.org/drawingml/2006/main" xmlns:r="http://schemas.openxmlformats.org/officeDocument/2006/relationships" xmlns:p="http://schemas.openxmlformats.org/presentationml/2006/main">
+<p:sld xmlns:a="http://schemas.openxmlformats.org/drawingml/2006/main" xmlns:r="http://schemas.openxmlformats.org/officeDocument/2006/relationships" xmlns:p="http://schemas.openxmlformats.org/presentationml/2006/main" show="0">
   <p:cSld>
     <p:spTree>
       <p:nvGrpSpPr>
@@ -4408,25 +4388,25 @@
           <p:nvPr>
             <p:extLst>
               <p:ext uri="{D42A27DB-BD31-4B8C-83A1-F6EECF244321}">
-                <p14:modId xmlns:p14="http://schemas.microsoft.com/office/powerpoint/2010/main" val="2473459355"/>
+                <p14:modId xmlns:p14="http://schemas.microsoft.com/office/powerpoint/2010/main" val="2559144700"/>
               </p:ext>
             </p:extLst>
           </p:nvPr>
         </p:nvGraphicFramePr>
         <p:xfrm>
-          <a:off x="498475" y="3754438"/>
-          <a:ext cx="8145463" cy="2451100"/>
+          <a:off x="530225" y="3754438"/>
+          <a:ext cx="8081963" cy="2451100"/>
         </p:xfrm>
         <a:graphic>
           <a:graphicData uri="http://schemas.openxmlformats.org/presentationml/2006/ole">
             <mc:AlternateContent xmlns:mc="http://schemas.openxmlformats.org/markup-compatibility/2006">
               <mc:Choice xmlns:v="urn:schemas-microsoft-com:vml" Requires="v">
-                <p:oleObj spid="_x0000_s211028" name="Equation" r:id="rId4" imgW="1651000" imgH="495300" progId="Equation.DSMT4">
+                <p:oleObj spid="_x0000_s211044" name="Equation" r:id="rId4" imgW="1638300" imgH="495300" progId="Equation.DSMT4">
                   <p:embed/>
                 </p:oleObj>
               </mc:Choice>
               <mc:Fallback>
-                <p:oleObj name="Equation" r:id="rId4" imgW="1651000" imgH="495300" progId="Equation.DSMT4">
+                <p:oleObj name="Equation" r:id="rId4" imgW="1638300" imgH="495300" progId="Equation.DSMT4">
                   <p:embed/>
                   <p:pic>
                     <p:nvPicPr>
@@ -4445,8 +4425,8 @@
                     </p:blipFill>
                     <p:spPr bwMode="auto">
                       <a:xfrm>
-                        <a:off x="498475" y="3754438"/>
-                        <a:ext cx="8145463" cy="2451100"/>
+                        <a:off x="530225" y="3754438"/>
+                        <a:ext cx="8081963" cy="2451100"/>
                       </a:xfrm>
                       <a:prstGeom prst="rect">
                         <a:avLst/>
@@ -4491,7 +4471,7 @@
           <a:graphicData uri="http://schemas.openxmlformats.org/presentationml/2006/ole">
             <mc:AlternateContent xmlns:mc="http://schemas.openxmlformats.org/markup-compatibility/2006">
               <mc:Choice xmlns:v="urn:schemas-microsoft-com:vml" Requires="v">
-                <p:oleObj spid="_x0000_s211029" name="Equation" r:id="rId6" imgW="1905000" imgH="381000" progId="Equation.DSMT4">
+                <p:oleObj spid="_x0000_s211045" name="Equation" r:id="rId6" imgW="1905000" imgH="381000" progId="Equation.DSMT4">
                   <p:embed/>
                 </p:oleObj>
               </mc:Choice>
@@ -4645,13 +4625,13 @@
   <p:clrMapOvr>
     <a:masterClrMapping/>
   </p:clrMapOvr>
-  <mc:AlternateContent xmlns:mc="http://schemas.openxmlformats.org/markup-compatibility/2006" xmlns:p14="http://schemas.microsoft.com/office/powerpoint/2010/main">
-    <mc:Choice Requires="p14">
+  <mc:AlternateContent xmlns:mc="http://schemas.openxmlformats.org/markup-compatibility/2006">
+    <mc:Choice xmlns:p14="http://schemas.microsoft.com/office/powerpoint/2010/main" Requires="p14">
       <p:transition spd="slow" p14:dur="1200">
         <p:fade thruBlk="1"/>
       </p:transition>
     </mc:Choice>
-    <mc:Fallback xmlns="">
+    <mc:Fallback>
       <p:transition xmlns:p14="http://schemas.microsoft.com/office/powerpoint/2010/main" spd="slow">
         <p:fade thruBlk="1"/>
       </p:transition>
@@ -5036,7 +5016,7 @@
 </file>
 
 <file path=ppt/slides/slide13.xml><?xml version="1.0" encoding="utf-8"?>
-<p:sld xmlns:a="http://schemas.openxmlformats.org/drawingml/2006/main" xmlns:r="http://schemas.openxmlformats.org/officeDocument/2006/relationships" xmlns:p="http://schemas.openxmlformats.org/presentationml/2006/main">
+<p:sld xmlns:a="http://schemas.openxmlformats.org/drawingml/2006/main" xmlns:r="http://schemas.openxmlformats.org/officeDocument/2006/relationships" xmlns:p="http://schemas.openxmlformats.org/presentationml/2006/main" show="0">
   <p:cSld>
     <p:spTree>
       <p:nvGrpSpPr>
@@ -5288,7 +5268,7 @@
           <a:graphicData uri="http://schemas.openxmlformats.org/presentationml/2006/ole">
             <mc:AlternateContent xmlns:mc="http://schemas.openxmlformats.org/markup-compatibility/2006">
               <mc:Choice xmlns:v="urn:schemas-microsoft-com:vml" Requires="v">
-                <p:oleObj spid="_x0000_s213043" name="Equation" r:id="rId4" imgW="914400" imgH="220320" progId="Equation.DSMT4">
+                <p:oleObj spid="_x0000_s213052" name="Equation" r:id="rId4" imgW="914400" imgH="220320" progId="Equation.DSMT4">
                   <p:embed/>
                 </p:oleObj>
               </mc:Choice>
@@ -6182,7 +6162,7 @@
 </file>
 
 <file path=ppt/slides/slide14.xml><?xml version="1.0" encoding="utf-8"?>
-<p:sld xmlns:a="http://schemas.openxmlformats.org/drawingml/2006/main" xmlns:r="http://schemas.openxmlformats.org/officeDocument/2006/relationships" xmlns:p="http://schemas.openxmlformats.org/presentationml/2006/main">
+<p:sld xmlns:a="http://schemas.openxmlformats.org/drawingml/2006/main" xmlns:r="http://schemas.openxmlformats.org/officeDocument/2006/relationships" xmlns:p="http://schemas.openxmlformats.org/presentationml/2006/main" show="0">
   <p:cSld>
     <p:spTree>
       <p:nvGrpSpPr>
@@ -6444,7 +6424,7 @@
           <a:graphicData uri="http://schemas.openxmlformats.org/presentationml/2006/ole">
             <mc:AlternateContent xmlns:mc="http://schemas.openxmlformats.org/markup-compatibility/2006">
               <mc:Choice xmlns:v="urn:schemas-microsoft-com:vml" Requires="v">
-                <p:oleObj spid="_x0000_s1104" name="Equation" r:id="rId4" imgW="914400" imgH="220320" progId="Equation.DSMT4">
+                <p:oleObj spid="_x0000_s1120" name="Equation" r:id="rId4" imgW="914400" imgH="220320" progId="Equation.DSMT4">
                   <p:embed/>
                 </p:oleObj>
               </mc:Choice>
@@ -6514,7 +6494,7 @@
           <a:graphicData uri="http://schemas.openxmlformats.org/presentationml/2006/ole">
             <mc:AlternateContent xmlns:mc="http://schemas.openxmlformats.org/markup-compatibility/2006">
               <mc:Choice xmlns:v="urn:schemas-microsoft-com:vml" Requires="v">
-                <p:oleObj spid="_x0000_s1105" name="Equation" r:id="rId6" imgW="634680" imgH="304560" progId="Equation.DSMT4">
+                <p:oleObj spid="_x0000_s1121" name="Equation" r:id="rId6" imgW="634680" imgH="304560" progId="Equation.DSMT4">
                   <p:embed/>
                 </p:oleObj>
               </mc:Choice>
@@ -6752,13 +6732,13 @@
   <p:clrMapOvr>
     <a:masterClrMapping/>
   </p:clrMapOvr>
-  <mc:AlternateContent xmlns:mc="http://schemas.openxmlformats.org/markup-compatibility/2006" xmlns:p14="http://schemas.microsoft.com/office/powerpoint/2010/main">
-    <mc:Choice Requires="p14">
+  <mc:AlternateContent xmlns:mc="http://schemas.openxmlformats.org/markup-compatibility/2006">
+    <mc:Choice xmlns:p14="http://schemas.microsoft.com/office/powerpoint/2010/main" Requires="p14">
       <p:transition spd="med" p14:dur="600">
         <p:fade/>
       </p:transition>
     </mc:Choice>
-    <mc:Fallback xmlns="">
+    <mc:Fallback>
       <p:transition xmlns:p14="http://schemas.microsoft.com/office/powerpoint/2010/main" spd="med">
         <p:fade/>
       </p:transition>
@@ -6915,7 +6895,7 @@
 </file>
 
 <file path=ppt/slides/slide3.xml><?xml version="1.0" encoding="utf-8"?>
-<p:sld xmlns:a="http://schemas.openxmlformats.org/drawingml/2006/main" xmlns:r="http://schemas.openxmlformats.org/officeDocument/2006/relationships" xmlns:p="http://schemas.openxmlformats.org/presentationml/2006/main" show="0">
+<p:sld xmlns:a="http://schemas.openxmlformats.org/drawingml/2006/main" xmlns:r="http://schemas.openxmlformats.org/officeDocument/2006/relationships" xmlns:p="http://schemas.openxmlformats.org/presentationml/2006/main">
   <p:cSld>
     <p:spTree>
       <p:nvGrpSpPr>
@@ -6933,15 +6913,168 @@
       </p:grpSpPr>
       <p:sp>
         <p:nvSpPr>
+          <p:cNvPr id="4" name="Rectangle 2"/>
+          <p:cNvSpPr>
+            <a:spLocks noGrp="1" noChangeArrowheads="1"/>
+          </p:cNvSpPr>
+          <p:nvPr>
+            <p:ph type="title"/>
+          </p:nvPr>
+        </p:nvSpPr>
+        <p:spPr>
+          <a:xfrm>
+            <a:off x="1600200" y="304800"/>
+            <a:ext cx="6019800" cy="1066800"/>
+          </a:xfrm>
+        </p:spPr>
+        <p:txBody>
+          <a:bodyPr/>
+          <a:lstStyle/>
+          <a:p>
+            <a:pPr eaLnBrk="1" hangingPunct="1"/>
+            <a:r>
+              <a:rPr lang="en-US" sz="4400" dirty="0" smtClean="0">
+                <a:solidFill>
+                  <a:schemeClr val="tx1"/>
+                </a:solidFill>
+              </a:rPr>
+              <a:t>Expected #Heads</a:t>
+            </a:r>
+          </a:p>
+        </p:txBody>
+      </p:sp>
+      <p:sp>
+        <p:nvSpPr>
+          <p:cNvPr id="6" name="TextBox 5"/>
+          <p:cNvSpPr txBox="1"/>
+          <p:nvPr/>
+        </p:nvSpPr>
+        <p:spPr>
+          <a:xfrm>
+            <a:off x="510284" y="1281445"/>
+            <a:ext cx="8389783" cy="3323987"/>
+          </a:xfrm>
+          <a:prstGeom prst="rect">
+            <a:avLst/>
+          </a:prstGeom>
+          <a:noFill/>
+        </p:spPr>
+        <p:txBody>
+          <a:bodyPr wrap="square" rtlCol="0">
+            <a:spAutoFit/>
+          </a:bodyPr>
+          <a:lstStyle/>
+          <a:p>
+            <a:r>
+              <a:rPr lang="en-US" sz="4800" i="0" dirty="0" smtClean="0">
+                <a:solidFill>
+                  <a:srgbClr val="0000FF"/>
+                </a:solidFill>
+                <a:latin typeface="+mj-lt"/>
+              </a:rPr>
+              <a:t>n</a:t>
+            </a:r>
+            <a:r>
+              <a:rPr lang="en-US" sz="4800" i="0" dirty="0" smtClean="0">
+                <a:latin typeface="+mj-lt"/>
+              </a:rPr>
+              <a:t> independent flips of a</a:t>
+            </a:r>
+          </a:p>
+          <a:p>
+            <a:r>
+              <a:rPr lang="en-US" sz="4800" i="0" dirty="0" smtClean="0">
+                <a:latin typeface="+mj-lt"/>
+              </a:rPr>
+              <a:t>coin with bias </a:t>
+            </a:r>
+            <a:r>
+              <a:rPr lang="en-US" sz="4800" i="0" dirty="0" smtClean="0">
+                <a:solidFill>
+                  <a:srgbClr val="0000FF"/>
+                </a:solidFill>
+                <a:latin typeface="+mj-lt"/>
+              </a:rPr>
+              <a:t>p</a:t>
+            </a:r>
+            <a:r>
+              <a:rPr lang="en-US" sz="4800" i="0" dirty="0" smtClean="0">
+                <a:latin typeface="+mj-lt"/>
+              </a:rPr>
+              <a:t> for Heads.</a:t>
+            </a:r>
+          </a:p>
+          <a:p>
+            <a:r>
+              <a:rPr lang="en-US" sz="4800" i="0" dirty="0" smtClean="0">
+                <a:latin typeface="+mj-lt"/>
+              </a:rPr>
+              <a:t>How many Heads expected?</a:t>
+            </a:r>
+            <a:endParaRPr lang="en-US" sz="4800" dirty="0" smtClean="0">
+              <a:solidFill>
+                <a:srgbClr val="3333FF"/>
+              </a:solidFill>
+              <a:latin typeface="+mj-lt"/>
+            </a:endParaRPr>
+          </a:p>
+          <a:p>
+            <a:pPr algn="ctr"/>
+            <a:r>
+              <a:rPr lang="en-US" sz="6600" dirty="0" smtClean="0">
+                <a:solidFill>
+                  <a:srgbClr val="3333FF"/>
+                </a:solidFill>
+                <a:latin typeface="+mj-lt"/>
+              </a:rPr>
+              <a:t>E[</a:t>
+            </a:r>
+            <a:r>
+              <a:rPr lang="en-US" sz="6600" dirty="0" smtClean="0">
+                <a:solidFill>
+                  <a:srgbClr val="006600"/>
+                </a:solidFill>
+                <a:latin typeface="+mj-lt"/>
+              </a:rPr>
+              <a:t># Heads</a:t>
+            </a:r>
+            <a:r>
+              <a:rPr lang="en-US" sz="6600" dirty="0" smtClean="0">
+                <a:solidFill>
+                  <a:srgbClr val="3333FF"/>
+                </a:solidFill>
+                <a:latin typeface="+mj-lt"/>
+              </a:rPr>
+              <a:t>]</a:t>
+            </a:r>
+            <a:endParaRPr lang="en-US" sz="6600" i="0" dirty="0" smtClean="0">
+              <a:solidFill>
+                <a:srgbClr val="3333FF"/>
+              </a:solidFill>
+              <a:latin typeface="+mj-lt"/>
+            </a:endParaRPr>
+          </a:p>
+        </p:txBody>
+      </p:sp>
+      <p:sp>
+        <p:nvSpPr>
           <p:cNvPr id="7" name="Slide Number Placeholder 3"/>
           <p:cNvSpPr>
             <a:spLocks noGrp="1"/>
           </p:cNvSpPr>
           <p:nvPr>
-            <p:ph type="sldNum" sz="quarter" idx="11"/>
-          </p:nvPr>
-        </p:nvSpPr>
-        <p:spPr/>
+            <p:ph type="sldNum" sz="quarter" idx="4294967295"/>
+          </p:nvPr>
+        </p:nvSpPr>
+        <p:spPr>
+          <a:xfrm>
+            <a:off x="7554913" y="6577965"/>
+            <a:ext cx="1527175" cy="244475"/>
+          </a:xfrm>
+          <a:prstGeom prst="rect">
+            <a:avLst/>
+          </a:prstGeom>
+        </p:spPr>
         <p:txBody>
           <a:bodyPr/>
           <a:lstStyle/>
@@ -6950,263 +7083,85 @@
               <a:defRPr/>
             </a:pPr>
             <a:r>
-              <a:rPr lang="en-US" dirty="0" err="1"/>
+              <a:rPr lang="en-US" sz="1200" dirty="0" err="1">
+                <a:latin typeface="Comic Sans MS"/>
+                <a:cs typeface="Comic Sans MS"/>
+              </a:rPr>
               <a:t>lec</a:t>
             </a:r>
             <a:r>
-              <a:rPr lang="en-US" dirty="0" smtClean="0"/>
+              <a:rPr lang="en-US" sz="1200" dirty="0" smtClean="0">
+                <a:latin typeface="Comic Sans MS"/>
+                <a:cs typeface="Comic Sans MS"/>
+              </a:rPr>
               <a:t> 12F.</a:t>
             </a:r>
-            <a:fld id="{39196791-36AF-407D-9527-253971E27E13}" type="slidenum">
-              <a:rPr lang="en-US" smtClean="0"/>
+            <a:fld id="{93DA0692-DAF7-4AFE-9BE7-E02439D3694A}" type="slidenum">
+              <a:rPr lang="en-US" sz="1200" smtClean="0">
+                <a:latin typeface="Comic Sans MS"/>
+                <a:cs typeface="Comic Sans MS"/>
+              </a:rPr>
               <a:pPr>
                 <a:defRPr/>
               </a:pPr>
               <a:t>3</a:t>
             </a:fld>
-            <a:endParaRPr lang="en-US" dirty="0"/>
-          </a:p>
-        </p:txBody>
-      </p:sp>
-      <p:sp>
-        <p:nvSpPr>
-          <p:cNvPr id="155651" name="Rectangle 3"/>
-          <p:cNvSpPr>
-            <a:spLocks noGrp="1" noChangeArrowheads="1"/>
-          </p:cNvSpPr>
-          <p:nvPr>
-            <p:ph type="body" sz="half" idx="4294967295"/>
-          </p:nvPr>
-        </p:nvSpPr>
-        <p:spPr>
-          <a:xfrm>
-            <a:off x="282291" y="877523"/>
-            <a:ext cx="8574088" cy="5413863"/>
-          </a:xfrm>
-        </p:spPr>
-        <p:txBody>
-          <a:bodyPr/>
-          <a:lstStyle/>
-          <a:p>
-            <a:pPr marL="0" indent="0" eaLnBrk="1" hangingPunct="1"/>
-            <a:r>
-              <a:rPr lang="en-US" dirty="0" smtClean="0"/>
-              <a:t>The </a:t>
-            </a:r>
-            <a:r>
-              <a:rPr lang="en-US" dirty="0" smtClean="0">
-                <a:solidFill>
-                  <a:srgbClr val="006600"/>
-                </a:solidFill>
-              </a:rPr>
-              <a:t>indicator variable </a:t>
-            </a:r>
-            <a:r>
-              <a:rPr lang="en-US" dirty="0" smtClean="0"/>
-              <a:t>for event </a:t>
-            </a:r>
-            <a:r>
-              <a:rPr lang="en-US" dirty="0" smtClean="0">
-                <a:solidFill>
-                  <a:srgbClr val="3333FF"/>
-                </a:solidFill>
-              </a:rPr>
-              <a:t>A</a:t>
-            </a:r>
-            <a:r>
-              <a:rPr lang="en-US" dirty="0" smtClean="0"/>
-              <a:t>: </a:t>
-            </a:r>
-            <a:endParaRPr lang="en-US" dirty="0" smtClean="0">
-              <a:solidFill>
-                <a:srgbClr val="006600"/>
-              </a:solidFill>
-            </a:endParaRPr>
-          </a:p>
-          <a:p>
-            <a:pPr marL="0" indent="0" eaLnBrk="1" hangingPunct="1"/>
-            <a:endParaRPr lang="en-US" dirty="0" smtClean="0"/>
-          </a:p>
-          <a:p>
-            <a:pPr marL="0" indent="0" eaLnBrk="1" hangingPunct="1"/>
-            <a:endParaRPr lang="en-US" dirty="0" smtClean="0">
-              <a:solidFill>
-                <a:schemeClr val="accent2"/>
-              </a:solidFill>
-            </a:endParaRPr>
-          </a:p>
-          <a:p>
-            <a:pPr marL="0" indent="0" eaLnBrk="1" hangingPunct="1"/>
-            <a:endParaRPr lang="en-US" dirty="0" smtClean="0">
-              <a:solidFill>
-                <a:schemeClr val="accent2"/>
-              </a:solidFill>
+            <a:endParaRPr lang="en-US" sz="1200" dirty="0">
+              <a:latin typeface="Comic Sans MS"/>
+              <a:cs typeface="Comic Sans MS"/>
             </a:endParaRPr>
           </a:p>
         </p:txBody>
       </p:sp>
       <p:graphicFrame>
         <p:nvGraphicFramePr>
-          <p:cNvPr id="8194" name="Object 4"/>
+          <p:cNvPr id="2" name="Object 1"/>
           <p:cNvGraphicFramePr>
-            <a:graphicFrameLocks noGrp="1" noChangeAspect="1"/>
+            <a:graphicFrameLocks noChangeAspect="1"/>
           </p:cNvGraphicFramePr>
           <p:nvPr>
-            <p:ph sz="quarter" idx="4294967295"/>
+            <p:extLst>
+              <p:ext uri="{D42A27DB-BD31-4B8C-83A1-F6EECF244321}">
+                <p14:modId xmlns:p14="http://schemas.microsoft.com/office/powerpoint/2010/main" val="37826930"/>
+              </p:ext>
+            </p:extLst>
           </p:nvPr>
         </p:nvGraphicFramePr>
         <p:xfrm>
-          <a:off x="488821" y="1641417"/>
-          <a:ext cx="8137142" cy="1999250"/>
+          <a:off x="2883451" y="4360203"/>
+          <a:ext cx="3358047" cy="1786195"/>
         </p:xfrm>
         <a:graphic>
           <a:graphicData uri="http://schemas.openxmlformats.org/presentationml/2006/ole">
             <mc:AlternateContent xmlns:mc="http://schemas.openxmlformats.org/markup-compatibility/2006">
               <mc:Choice xmlns:v="urn:schemas-microsoft-com:vml" Requires="v">
-                <p:oleObj spid="_x0000_s486480" name="Equation" r:id="rId4" imgW="2171700" imgH="533400" progId="Equation.DSMT4">
+                <p:oleObj spid="_x0000_s585735" name="Equation" r:id="rId4" imgW="596900" imgH="317500" progId="Equation.DSMT4">
                   <p:embed/>
                 </p:oleObj>
               </mc:Choice>
               <mc:Fallback>
-                <p:oleObj name="Equation" r:id="rId4" imgW="2171700" imgH="533400" progId="Equation.DSMT4">
+                <p:oleObj name="Equation" r:id="rId4" imgW="596900" imgH="317500" progId="Equation.DSMT4">
                   <p:embed/>
                   <p:pic>
                     <p:nvPicPr>
-                      <p:cNvPr id="0" name="Object 4"/>
-                      <p:cNvPicPr>
-                        <a:picLocks noChangeAspect="1" noChangeArrowheads="1"/>
-                      </p:cNvPicPr>
+                      <p:cNvPr id="0" name=""/>
+                      <p:cNvPicPr/>
                       <p:nvPr/>
                     </p:nvPicPr>
                     <p:blipFill>
-                      <a:blip r:embed="rId5">
-                        <a:extLst>
-                          <a:ext uri="{28A0092B-C50C-407E-A947-70E740481C1C}">
-                            <a14:useLocalDpi xmlns:a14="http://schemas.microsoft.com/office/drawing/2010/main" val="0"/>
-                          </a:ext>
-                        </a:extLst>
-                      </a:blip>
-                      <a:srcRect/>
+                      <a:blip r:embed="rId5"/>
                       <a:stretch>
                         <a:fillRect/>
                       </a:stretch>
                     </p:blipFill>
-                    <p:spPr bwMode="auto">
+                    <p:spPr>
                       <a:xfrm>
-                        <a:off x="488821" y="1641417"/>
-                        <a:ext cx="8137142" cy="1999250"/>
+                        <a:off x="2883451" y="4360203"/>
+                        <a:ext cx="3358047" cy="1786195"/>
                       </a:xfrm>
                       <a:prstGeom prst="rect">
                         <a:avLst/>
                       </a:prstGeom>
-                      <a:noFill/>
-                      <a:extLst>
-                        <a:ext uri="{909E8E84-426E-40dd-AFC4-6F175D3DCCD1}">
-                          <a14:hiddenFill xmlns:a14="http://schemas.microsoft.com/office/drawing/2010/main">
-                            <a:solidFill>
-                              <a:srgbClr val="FFFFFF"/>
-                            </a:solidFill>
-                          </a14:hiddenFill>
-                        </a:ext>
-                      </a:extLst>
-                    </p:spPr>
-                  </p:pic>
-                </p:oleObj>
-              </mc:Fallback>
-            </mc:AlternateContent>
-          </a:graphicData>
-        </a:graphic>
-      </p:graphicFrame>
-      <p:sp>
-        <p:nvSpPr>
-          <p:cNvPr id="8197" name="Rectangle 2"/>
-          <p:cNvSpPr>
-            <a:spLocks noGrp="1" noChangeArrowheads="1"/>
-          </p:cNvSpPr>
-          <p:nvPr>
-            <p:ph type="title" idx="4294967295"/>
-          </p:nvPr>
-        </p:nvSpPr>
-        <p:spPr>
-          <a:xfrm>
-            <a:off x="1474788" y="130175"/>
-            <a:ext cx="6553200" cy="838200"/>
-          </a:xfrm>
-        </p:spPr>
-        <p:txBody>
-          <a:bodyPr/>
-          <a:lstStyle/>
-          <a:p>
-            <a:pPr eaLnBrk="1" hangingPunct="1"/>
-            <a:r>
-              <a:rPr lang="en-US" smtClean="0"/>
-              <a:t>Indicator Variables</a:t>
-            </a:r>
-          </a:p>
-        </p:txBody>
-      </p:sp>
-      <p:graphicFrame>
-        <p:nvGraphicFramePr>
-          <p:cNvPr id="486405" name="Object 4"/>
-          <p:cNvGraphicFramePr>
-            <a:graphicFrameLocks noChangeAspect="1"/>
-          </p:cNvGraphicFramePr>
-          <p:nvPr>
-            <p:extLst>
-              <p:ext uri="{D42A27DB-BD31-4B8C-83A1-F6EECF244321}">
-                <p14:modId xmlns:p14="http://schemas.microsoft.com/office/powerpoint/2010/main" val="3225948994"/>
-              </p:ext>
-            </p:extLst>
-          </p:nvPr>
-        </p:nvGraphicFramePr>
-        <p:xfrm>
-          <a:off x="1390650" y="3954463"/>
-          <a:ext cx="6303963" cy="1658937"/>
-        </p:xfrm>
-        <a:graphic>
-          <a:graphicData uri="http://schemas.openxmlformats.org/presentationml/2006/ole">
-            <mc:AlternateContent xmlns:mc="http://schemas.openxmlformats.org/markup-compatibility/2006">
-              <mc:Choice xmlns:v="urn:schemas-microsoft-com:vml" Requires="v">
-                <p:oleObj spid="_x0000_s486481" name="Equation" r:id="rId6" imgW="1257300" imgH="330200" progId="Equation.DSMT4">
-                  <p:embed/>
-                </p:oleObj>
-              </mc:Choice>
-              <mc:Fallback>
-                <p:oleObj name="Equation" r:id="rId6" imgW="1257300" imgH="330200" progId="Equation.DSMT4">
-                  <p:embed/>
-                  <p:pic>
-                    <p:nvPicPr>
-                      <p:cNvPr id="0" name="Picture 5"/>
-                      <p:cNvPicPr>
-                        <a:picLocks noChangeAspect="1" noChangeArrowheads="1"/>
-                      </p:cNvPicPr>
-                      <p:nvPr/>
-                    </p:nvPicPr>
-                    <p:blipFill>
-                      <a:blip r:embed="rId7"/>
-                      <a:srcRect/>
-                      <a:stretch>
-                        <a:fillRect/>
-                      </a:stretch>
-                    </p:blipFill>
-                    <p:spPr bwMode="auto">
-                      <a:xfrm>
-                        <a:off x="1390650" y="3954463"/>
-                        <a:ext cx="6303963" cy="1658937"/>
-                      </a:xfrm>
-                      <a:prstGeom prst="rect">
-                        <a:avLst/>
-                      </a:prstGeom>
-                      <a:noFill/>
-                      <a:extLst>
-                        <a:ext uri="{909E8E84-426E-40dd-AFC4-6F175D3DCCD1}">
-                          <a14:hiddenFill xmlns:a14="http://schemas.microsoft.com/office/drawing/2010/main">
-                            <a:solidFill>
-                              <a:srgbClr val="FFFFFF"/>
-                            </a:solidFill>
-                          </a14:hiddenFill>
-                        </a:ext>
-                      </a:extLst>
                     </p:spPr>
                   </p:pic>
                 </p:oleObj>
@@ -7216,13 +7171,27 @@
         </a:graphic>
       </p:graphicFrame>
     </p:spTree>
+    <p:extLst>
+      <p:ext uri="{BB962C8B-B14F-4D97-AF65-F5344CB8AC3E}">
+        <p14:creationId xmlns:p14="http://schemas.microsoft.com/office/powerpoint/2010/main" val="1266718790"/>
+      </p:ext>
+    </p:extLst>
   </p:cSld>
   <p:clrMapOvr>
     <a:masterClrMapping/>
   </p:clrMapOvr>
-  <p:transition xmlns:p14="http://schemas.microsoft.com/office/powerpoint/2010/main">
-    <p:fade thruBlk="1"/>
-  </p:transition>
+  <mc:AlternateContent xmlns:mc="http://schemas.openxmlformats.org/markup-compatibility/2006" xmlns:p14="http://schemas.microsoft.com/office/powerpoint/2010/main">
+    <mc:Choice Requires="p14">
+      <p:transition p14:dur="400" advClick="0">
+        <p:fade/>
+      </p:transition>
+    </mc:Choice>
+    <mc:Fallback xmlns="">
+      <p:transition xmlns:p14="http://schemas.microsoft.com/office/powerpoint/2010/main" advClick="0">
+        <p:fade/>
+      </p:transition>
+    </mc:Fallback>
+  </mc:AlternateContent>
   <p:timing>
     <p:tnLst>
       <p:par>
@@ -7257,7 +7226,11 @@
                                           </p:stCondLst>
                                         </p:cTn>
                                         <p:tgtEl>
-                                          <p:spTgt spid="486405"/>
+                                          <p:spTgt spid="6">
+                                            <p:txEl>
+                                              <p:pRg st="3" end="3"/>
+                                            </p:txEl>
+                                          </p:spTgt>
                                         </p:tgtEl>
                                         <p:attrNameLst>
                                           <p:attrName>style.visibility</p:attrName>
@@ -7271,7 +7244,64 @@
                                       <p:cBhvr>
                                         <p:cTn id="7" dur="500"/>
                                         <p:tgtEl>
-                                          <p:spTgt spid="486405"/>
+                                          <p:spTgt spid="6">
+                                            <p:txEl>
+                                              <p:pRg st="3" end="3"/>
+                                            </p:txEl>
+                                          </p:spTgt>
+                                        </p:tgtEl>
+                                      </p:cBhvr>
+                                    </p:animEffect>
+                                  </p:childTnLst>
+                                </p:cTn>
+                              </p:par>
+                            </p:childTnLst>
+                          </p:cTn>
+                        </p:par>
+                      </p:childTnLst>
+                    </p:cTn>
+                  </p:par>
+                  <p:par>
+                    <p:cTn id="8" fill="hold">
+                      <p:stCondLst>
+                        <p:cond delay="indefinite"/>
+                      </p:stCondLst>
+                      <p:childTnLst>
+                        <p:par>
+                          <p:cTn id="9" fill="hold">
+                            <p:stCondLst>
+                              <p:cond delay="0"/>
+                            </p:stCondLst>
+                            <p:childTnLst>
+                              <p:par>
+                                <p:cTn id="10" presetID="22" presetClass="entr" presetSubtype="8" fill="hold" nodeType="clickEffect">
+                                  <p:stCondLst>
+                                    <p:cond delay="0"/>
+                                  </p:stCondLst>
+                                  <p:childTnLst>
+                                    <p:set>
+                                      <p:cBhvr>
+                                        <p:cTn id="11" dur="1" fill="hold">
+                                          <p:stCondLst>
+                                            <p:cond delay="0"/>
+                                          </p:stCondLst>
+                                        </p:cTn>
+                                        <p:tgtEl>
+                                          <p:spTgt spid="2"/>
+                                        </p:tgtEl>
+                                        <p:attrNameLst>
+                                          <p:attrName>style.visibility</p:attrName>
+                                        </p:attrNameLst>
+                                      </p:cBhvr>
+                                      <p:to>
+                                        <p:strVal val="visible"/>
+                                      </p:to>
+                                    </p:set>
+                                    <p:animEffect transition="in" filter="wipe(left)">
+                                      <p:cBhvr>
+                                        <p:cTn id="12" dur="1000"/>
+                                        <p:tgtEl>
+                                          <p:spTgt spid="2"/>
                                         </p:tgtEl>
                                       </p:cBhvr>
                                     </p:animEffect>
@@ -7328,272 +7358,24 @@
       </p:grpSpPr>
       <p:sp>
         <p:nvSpPr>
-          <p:cNvPr id="3" name="Content Placeholder 2"/>
+          <p:cNvPr id="4" name="Rectangle 2"/>
           <p:cNvSpPr>
-            <a:spLocks noGrp="1"/>
+            <a:spLocks noGrp="1" noChangeArrowheads="1"/>
           </p:cNvSpPr>
           <p:nvPr>
-            <p:ph idx="1"/>
+            <p:ph type="title"/>
           </p:nvPr>
         </p:nvSpPr>
         <p:spPr>
           <a:xfrm>
-            <a:off x="578324" y="1276584"/>
-            <a:ext cx="7994438" cy="4949199"/>
+            <a:off x="1600200" y="304800"/>
+            <a:ext cx="6019800" cy="1066800"/>
           </a:xfrm>
         </p:spPr>
         <p:txBody>
           <a:bodyPr/>
           <a:lstStyle/>
           <a:p>
-            <a:pPr>
-              <a:buNone/>
-            </a:pPr>
-            <a:r>
-              <a:rPr lang="en-US" sz="6000" dirty="0" smtClean="0"/>
-              <a:t>E[</a:t>
-            </a:r>
-            <a:r>
-              <a:rPr lang="en-US" sz="6000" dirty="0" smtClean="0">
-                <a:solidFill>
-                  <a:srgbClr val="0000FF"/>
-                </a:solidFill>
-              </a:rPr>
-              <a:t>I</a:t>
-            </a:r>
-            <a:r>
-              <a:rPr lang="en-US" sz="6000" baseline="-25000" dirty="0" smtClean="0">
-                <a:solidFill>
-                  <a:srgbClr val="0000FF"/>
-                </a:solidFill>
-              </a:rPr>
-              <a:t>A</a:t>
-            </a:r>
-            <a:r>
-              <a:rPr lang="en-US" sz="6000" dirty="0" smtClean="0"/>
-              <a:t>] ::= </a:t>
-            </a:r>
-            <a:r>
-              <a:rPr lang="en-US" sz="6000" dirty="0" smtClean="0">
-                <a:solidFill>
-                  <a:srgbClr val="0000FF"/>
-                </a:solidFill>
-                <a:sym typeface="Euclid Symbol"/>
-              </a:rPr>
-              <a:t>1</a:t>
-            </a:r>
-            <a:r>
-              <a:rPr lang="en-US" sz="6000" dirty="0" smtClean="0">
-                <a:sym typeface="Euclid Symbol"/>
-              </a:rPr>
-              <a:t>⋅P</a:t>
-            </a:r>
-            <a:r>
-              <a:rPr lang="en-US" sz="6000" dirty="0" smtClean="0"/>
-              <a:t>r[</a:t>
-            </a:r>
-            <a:r>
-              <a:rPr lang="en-US" sz="6000" dirty="0" smtClean="0">
-                <a:solidFill>
-                  <a:srgbClr val="0000FF"/>
-                </a:solidFill>
-              </a:rPr>
-              <a:t>I</a:t>
-            </a:r>
-            <a:r>
-              <a:rPr lang="en-US" sz="6000" baseline="-25000" dirty="0" smtClean="0">
-                <a:solidFill>
-                  <a:srgbClr val="0000FF"/>
-                </a:solidFill>
-              </a:rPr>
-              <a:t>A</a:t>
-            </a:r>
-            <a:r>
-              <a:rPr lang="en-US" sz="6000" dirty="0" smtClean="0">
-                <a:solidFill>
-                  <a:srgbClr val="0000FF"/>
-                </a:solidFill>
-              </a:rPr>
-              <a:t>=1</a:t>
-            </a:r>
-            <a:r>
-              <a:rPr lang="en-US" sz="6000" dirty="0" smtClean="0"/>
-              <a:t>]</a:t>
-            </a:r>
-            <a:r>
-              <a:rPr lang="en-US" sz="6000" dirty="0" smtClean="0">
-                <a:solidFill>
-                  <a:srgbClr val="0000FF"/>
-                </a:solidFill>
-                <a:sym typeface="Euclid Symbol"/>
-              </a:rPr>
-              <a:t> </a:t>
-            </a:r>
-            <a:r>
-              <a:rPr lang="en-US" sz="6000" dirty="0" smtClean="0">
-                <a:sym typeface="Euclid Symbol"/>
-              </a:rPr>
-              <a:t>+</a:t>
-            </a:r>
-          </a:p>
-          <a:p>
-            <a:pPr>
-              <a:buNone/>
-            </a:pPr>
-            <a:r>
-              <a:rPr lang="en-US" sz="6000" dirty="0" smtClean="0">
-                <a:solidFill>
-                  <a:srgbClr val="0000FF"/>
-                </a:solidFill>
-                <a:sym typeface="Euclid Symbol"/>
-              </a:rPr>
-              <a:t>              0</a:t>
-            </a:r>
-            <a:r>
-              <a:rPr lang="en-US" sz="6000" dirty="0" smtClean="0">
-                <a:sym typeface="Euclid Symbol"/>
-              </a:rPr>
-              <a:t>⋅</a:t>
-            </a:r>
-            <a:r>
-              <a:rPr lang="en-US" sz="6000" dirty="0" smtClean="0"/>
-              <a:t>Pr[</a:t>
-            </a:r>
-            <a:r>
-              <a:rPr lang="en-US" sz="6000" dirty="0" smtClean="0">
-                <a:solidFill>
-                  <a:srgbClr val="0000FF"/>
-                </a:solidFill>
-              </a:rPr>
-              <a:t>I</a:t>
-            </a:r>
-            <a:r>
-              <a:rPr lang="en-US" sz="6000" baseline="-25000" dirty="0" smtClean="0">
-                <a:solidFill>
-                  <a:srgbClr val="0000FF"/>
-                </a:solidFill>
-              </a:rPr>
-              <a:t>A</a:t>
-            </a:r>
-            <a:r>
-              <a:rPr lang="en-US" sz="6000" dirty="0" smtClean="0">
-                <a:solidFill>
-                  <a:srgbClr val="0000FF"/>
-                </a:solidFill>
-              </a:rPr>
-              <a:t>=0</a:t>
-            </a:r>
-            <a:r>
-              <a:rPr lang="en-US" sz="6000" dirty="0" smtClean="0"/>
-              <a:t>]</a:t>
-            </a:r>
-          </a:p>
-          <a:p>
-            <a:pPr>
-              <a:buNone/>
-            </a:pPr>
-            <a:r>
-              <a:rPr lang="en-US" sz="6000" dirty="0" smtClean="0"/>
-              <a:t>         = </a:t>
-            </a:r>
-            <a:r>
-              <a:rPr lang="en-US" sz="6000" dirty="0" err="1" smtClean="0"/>
-              <a:t>Pr</a:t>
-            </a:r>
-            <a:r>
-              <a:rPr lang="en-US" sz="6000" dirty="0" smtClean="0"/>
-              <a:t>[</a:t>
-            </a:r>
-            <a:r>
-              <a:rPr lang="en-US" sz="6000" dirty="0" smtClean="0">
-                <a:solidFill>
-                  <a:srgbClr val="0000FF"/>
-                </a:solidFill>
-              </a:rPr>
-              <a:t>I</a:t>
-            </a:r>
-            <a:r>
-              <a:rPr lang="en-US" sz="6000" baseline="-25000" dirty="0" smtClean="0">
-                <a:solidFill>
-                  <a:srgbClr val="0000FF"/>
-                </a:solidFill>
-              </a:rPr>
-              <a:t>A</a:t>
-            </a:r>
-            <a:r>
-              <a:rPr lang="en-US" sz="6000" dirty="0" smtClean="0">
-                <a:solidFill>
-                  <a:srgbClr val="0000FF"/>
-                </a:solidFill>
-              </a:rPr>
-              <a:t>=1</a:t>
-            </a:r>
-            <a:r>
-              <a:rPr lang="en-US" sz="6000" dirty="0" smtClean="0"/>
-              <a:t>]</a:t>
-            </a:r>
-          </a:p>
-          <a:p>
-            <a:pPr>
-              <a:buNone/>
-            </a:pPr>
-            <a:r>
-              <a:rPr lang="en-US" sz="6000" dirty="0" smtClean="0"/>
-              <a:t>         = </a:t>
-            </a:r>
-            <a:r>
-              <a:rPr lang="en-US" sz="6000" dirty="0" err="1" smtClean="0"/>
-              <a:t>Pr</a:t>
-            </a:r>
-            <a:r>
-              <a:rPr lang="en-US" sz="6000" dirty="0" smtClean="0"/>
-              <a:t>[</a:t>
-            </a:r>
-            <a:r>
-              <a:rPr lang="en-US" sz="6000" dirty="0" smtClean="0">
-                <a:solidFill>
-                  <a:srgbClr val="0000FF"/>
-                </a:solidFill>
-              </a:rPr>
-              <a:t>A</a:t>
-            </a:r>
-            <a:r>
-              <a:rPr lang="en-US" sz="6000" dirty="0" smtClean="0"/>
-              <a:t>]</a:t>
-            </a:r>
-          </a:p>
-          <a:p>
-            <a:pPr>
-              <a:buNone/>
-            </a:pPr>
-            <a:r>
-              <a:rPr lang="en-US" sz="6000" dirty="0" smtClean="0"/>
-              <a:t>        </a:t>
-            </a:r>
-            <a:endParaRPr lang="en-US" sz="6000" dirty="0"/>
-          </a:p>
-        </p:txBody>
-      </p:sp>
-      <p:sp>
-        <p:nvSpPr>
-          <p:cNvPr id="8" name="Rectangle 2"/>
-          <p:cNvSpPr>
-            <a:spLocks noGrp="1" noChangeArrowheads="1"/>
-          </p:cNvSpPr>
-          <p:nvPr>
-            <p:ph type="title"/>
-          </p:nvPr>
-        </p:nvSpPr>
-        <p:spPr>
-          <a:xfrm>
-            <a:off x="1086558" y="152399"/>
-            <a:ext cx="8001000" cy="1108193"/>
-          </a:xfrm>
-        </p:spPr>
-        <p:txBody>
-          <a:bodyPr/>
-          <a:lstStyle/>
-          <a:p>
             <a:pPr eaLnBrk="1" hangingPunct="1"/>
             <a:r>
               <a:rPr lang="en-US" sz="4400" dirty="0" smtClean="0">
@@ -7601,177 +7383,88 @@
                   <a:schemeClr val="tx1"/>
                 </a:solidFill>
               </a:rPr>
-              <a:t>Expectation </a:t>
-            </a:r>
-            <a:r>
-              <a:rPr lang="en-US" sz="4400" dirty="0" smtClean="0"/>
-              <a:t>of indicator </a:t>
-            </a:r>
-            <a:r>
-              <a:rPr lang="en-US" sz="4400" dirty="0" smtClean="0">
+              <a:t>Expected #Heads</a:t>
+            </a:r>
+          </a:p>
+        </p:txBody>
+      </p:sp>
+      <p:sp>
+        <p:nvSpPr>
+          <p:cNvPr id="6" name="TextBox 5"/>
+          <p:cNvSpPr txBox="1"/>
+          <p:nvPr/>
+        </p:nvSpPr>
+        <p:spPr>
+          <a:xfrm>
+            <a:off x="510284" y="1281445"/>
+            <a:ext cx="8389783" cy="2308324"/>
+          </a:xfrm>
+          <a:prstGeom prst="rect">
+            <a:avLst/>
+          </a:prstGeom>
+          <a:noFill/>
+        </p:spPr>
+        <p:txBody>
+          <a:bodyPr wrap="square" rtlCol="0">
+            <a:spAutoFit/>
+          </a:bodyPr>
+          <a:lstStyle/>
+          <a:p>
+            <a:r>
+              <a:rPr lang="en-US" sz="4800" i="0" dirty="0" smtClean="0">
                 <a:solidFill>
                   <a:srgbClr val="0000FF"/>
                 </a:solidFill>
-              </a:rPr>
-              <a:t>I</a:t>
-            </a:r>
-            <a:r>
-              <a:rPr lang="en-US" sz="4400" baseline="-25000" dirty="0" smtClean="0">
+                <a:latin typeface="+mj-lt"/>
+              </a:rPr>
+              <a:t>n</a:t>
+            </a:r>
+            <a:r>
+              <a:rPr lang="en-US" sz="4800" i="0" dirty="0" smtClean="0">
+                <a:latin typeface="+mj-lt"/>
+              </a:rPr>
+              <a:t> independent flips of a</a:t>
+            </a:r>
+          </a:p>
+          <a:p>
+            <a:r>
+              <a:rPr lang="en-US" sz="4800" i="0" dirty="0" smtClean="0">
+                <a:latin typeface="+mj-lt"/>
+              </a:rPr>
+              <a:t>coin with bias </a:t>
+            </a:r>
+            <a:r>
+              <a:rPr lang="en-US" sz="4800" i="0" dirty="0" smtClean="0">
                 <a:solidFill>
                   <a:srgbClr val="0000FF"/>
                 </a:solidFill>
-              </a:rPr>
-              <a:t>A</a:t>
-            </a:r>
-            <a:endParaRPr lang="en-US" sz="4400" dirty="0" smtClean="0">
+                <a:latin typeface="+mj-lt"/>
+              </a:rPr>
+              <a:t>p</a:t>
+            </a:r>
+            <a:r>
+              <a:rPr lang="en-US" sz="4800" i="0" dirty="0" smtClean="0">
+                <a:latin typeface="+mj-lt"/>
+              </a:rPr>
+              <a:t> for Heads.</a:t>
+            </a:r>
+          </a:p>
+          <a:p>
+            <a:r>
+              <a:rPr lang="en-US" sz="4800" i="0" dirty="0" smtClean="0">
+                <a:latin typeface="+mj-lt"/>
+              </a:rPr>
+              <a:t>How many Heads expected?</a:t>
+            </a:r>
+            <a:endParaRPr lang="en-US" sz="4800" dirty="0" smtClean="0">
               <a:solidFill>
-                <a:srgbClr val="0000FF"/>
+                <a:srgbClr val="3333FF"/>
               </a:solidFill>
+              <a:latin typeface="+mj-lt"/>
             </a:endParaRPr>
           </a:p>
         </p:txBody>
       </p:sp>
-      <p:grpSp>
-        <p:nvGrpSpPr>
-          <p:cNvPr id="10" name="Group 9"/>
-          <p:cNvGrpSpPr/>
-          <p:nvPr/>
-        </p:nvGrpSpPr>
-        <p:grpSpPr>
-          <a:xfrm>
-            <a:off x="536223" y="1281085"/>
-            <a:ext cx="5108221" cy="4534371"/>
-            <a:chOff x="536223" y="1326445"/>
-            <a:chExt cx="5108221" cy="4534371"/>
-          </a:xfrm>
-        </p:grpSpPr>
-        <p:sp>
-          <p:nvSpPr>
-            <p:cNvPr id="6" name="Rectangle 5"/>
-            <p:cNvSpPr/>
-            <p:nvPr/>
-          </p:nvSpPr>
-          <p:spPr bwMode="auto">
-            <a:xfrm>
-              <a:off x="2541271" y="4608404"/>
-              <a:ext cx="3103173" cy="1252412"/>
-            </a:xfrm>
-            <a:prstGeom prst="rect">
-              <a:avLst/>
-            </a:prstGeom>
-            <a:noFill/>
-            <a:ln w="34925" cap="flat" cmpd="sng" algn="ctr">
-              <a:solidFill>
-                <a:srgbClr val="FF00FF"/>
-              </a:solidFill>
-              <a:prstDash val="sysDash"/>
-              <a:round/>
-              <a:headEnd type="none" w="med" len="med"/>
-              <a:tailEnd type="arrow" w="lg" len="lg"/>
-            </a:ln>
-            <a:effectLst/>
-          </p:spPr>
-          <p:txBody>
-            <a:bodyPr vert="horz" wrap="square" lIns="91440" tIns="45720" rIns="91440" bIns="45720" numCol="1" rtlCol="0" anchor="t" anchorCtr="0" compatLnSpc="1">
-              <a:prstTxWarp prst="textNoShape">
-                <a:avLst/>
-              </a:prstTxWarp>
-            </a:bodyPr>
-            <a:lstStyle/>
-            <a:p>
-              <a:pPr marL="0" marR="0" indent="0" algn="l" defTabSz="914400" rtl="0" eaLnBrk="1" fontAlgn="base" latinLnBrk="0" hangingPunct="1">
-                <a:lnSpc>
-                  <a:spcPct val="100000"/>
-                </a:lnSpc>
-                <a:spcBef>
-                  <a:spcPct val="0"/>
-                </a:spcBef>
-                <a:spcAft>
-                  <a:spcPct val="0"/>
-                </a:spcAft>
-                <a:buClrTx/>
-                <a:buSzTx/>
-                <a:buFontTx/>
-                <a:buNone/>
-                <a:tabLst/>
-              </a:pPr>
-              <a:endParaRPr kumimoji="0" lang="en-US" sz="3600" b="0" i="1" u="none" strike="noStrike" cap="none" normalizeH="0" baseline="0" smtClean="0">
-                <a:ln>
-                  <a:noFill/>
-                </a:ln>
-                <a:solidFill>
-                  <a:schemeClr val="tx1"/>
-                </a:solidFill>
-                <a:effectLst/>
-                <a:latin typeface="Times New Roman" pitchFamily="18" charset="0"/>
-              </a:endParaRPr>
-            </a:p>
-          </p:txBody>
-        </p:sp>
-        <p:sp>
-          <p:nvSpPr>
-            <p:cNvPr id="9" name="Rectangle 8"/>
-            <p:cNvSpPr/>
-            <p:nvPr/>
-          </p:nvSpPr>
-          <p:spPr bwMode="auto">
-            <a:xfrm>
-              <a:off x="536223" y="1326445"/>
-              <a:ext cx="2186414" cy="1194740"/>
-            </a:xfrm>
-            <a:prstGeom prst="rect">
-              <a:avLst/>
-            </a:prstGeom>
-            <a:noFill/>
-            <a:ln w="34925" cap="flat" cmpd="sng" algn="ctr">
-              <a:solidFill>
-                <a:srgbClr val="FF00FF"/>
-              </a:solidFill>
-              <a:prstDash val="sysDash"/>
-              <a:round/>
-              <a:headEnd type="none" w="med" len="med"/>
-              <a:tailEnd type="arrow" w="lg" len="lg"/>
-            </a:ln>
-            <a:effectLst/>
-          </p:spPr>
-          <p:txBody>
-            <a:bodyPr vert="horz" wrap="square" lIns="91440" tIns="45720" rIns="91440" bIns="45720" numCol="1" rtlCol="0" anchor="t" anchorCtr="0" compatLnSpc="1">
-              <a:prstTxWarp prst="textNoShape">
-                <a:avLst/>
-              </a:prstTxWarp>
-            </a:bodyPr>
-            <a:lstStyle/>
-            <a:p>
-              <a:pPr marL="0" marR="0" indent="0" algn="l" defTabSz="914400" rtl="0" eaLnBrk="1" fontAlgn="base" latinLnBrk="0" hangingPunct="1">
-                <a:lnSpc>
-                  <a:spcPct val="100000"/>
-                </a:lnSpc>
-                <a:spcBef>
-                  <a:spcPct val="0"/>
-                </a:spcBef>
-                <a:spcAft>
-                  <a:spcPct val="0"/>
-                </a:spcAft>
-                <a:buClrTx/>
-                <a:buSzTx/>
-                <a:buFontTx/>
-                <a:buNone/>
-                <a:tabLst/>
-              </a:pPr>
-              <a:endParaRPr kumimoji="0" lang="en-US" sz="3600" b="0" i="1" u="none" strike="noStrike" cap="none" normalizeH="0" baseline="0" smtClean="0">
-                <a:ln>
-                  <a:noFill/>
-                </a:ln>
-                <a:solidFill>
-                  <a:schemeClr val="tx1"/>
-                </a:solidFill>
-                <a:effectLst/>
-                <a:latin typeface="Times New Roman" pitchFamily="18" charset="0"/>
-              </a:endParaRPr>
-            </a:p>
-          </p:txBody>
-        </p:sp>
-      </p:grpSp>
       <p:sp>
         <p:nvSpPr>
           <p:cNvPr id="7" name="Slide Number Placeholder 3"/>
@@ -7829,903 +7522,34 @@
           </a:p>
         </p:txBody>
       </p:sp>
-    </p:spTree>
-  </p:cSld>
-  <p:clrMapOvr>
-    <a:masterClrMapping/>
-  </p:clrMapOvr>
-  <p:transition xmlns:p14="http://schemas.microsoft.com/office/powerpoint/2010/main">
-    <p:fade/>
-  </p:transition>
-  <p:timing>
-    <p:tnLst>
-      <p:par>
-        <p:cTn xmlns:p14="http://schemas.microsoft.com/office/powerpoint/2010/main" id="1" dur="indefinite" restart="never" nodeType="tmRoot">
-          <p:childTnLst>
-            <p:seq concurrent="1" nextAc="seek">
-              <p:cTn id="2" dur="indefinite" nodeType="mainSeq">
-                <p:childTnLst>
-                  <p:par>
-                    <p:cTn id="3" fill="hold">
-                      <p:stCondLst>
-                        <p:cond delay="indefinite"/>
-                      </p:stCondLst>
-                      <p:childTnLst>
-                        <p:par>
-                          <p:cTn id="4" fill="hold">
-                            <p:stCondLst>
-                              <p:cond delay="0"/>
-                            </p:stCondLst>
-                            <p:childTnLst>
-                              <p:par>
-                                <p:cTn id="5" presetID="22" presetClass="entr" presetSubtype="8" fill="hold" nodeType="clickEffect">
-                                  <p:stCondLst>
-                                    <p:cond delay="0"/>
-                                  </p:stCondLst>
-                                  <p:childTnLst>
-                                    <p:set>
-                                      <p:cBhvr>
-                                        <p:cTn id="6" dur="1" fill="hold">
-                                          <p:stCondLst>
-                                            <p:cond delay="0"/>
-                                          </p:stCondLst>
-                                        </p:cTn>
-                                        <p:tgtEl>
-                                          <p:spTgt spid="3">
-                                            <p:txEl>
-                                              <p:pRg st="0" end="0"/>
-                                            </p:txEl>
-                                          </p:spTgt>
-                                        </p:tgtEl>
-                                        <p:attrNameLst>
-                                          <p:attrName>style.visibility</p:attrName>
-                                        </p:attrNameLst>
-                                      </p:cBhvr>
-                                      <p:to>
-                                        <p:strVal val="visible"/>
-                                      </p:to>
-                                    </p:set>
-                                    <p:animEffect transition="in" filter="wipe(left)">
-                                      <p:cBhvr>
-                                        <p:cTn id="7" dur="1000"/>
-                                        <p:tgtEl>
-                                          <p:spTgt spid="3">
-                                            <p:txEl>
-                                              <p:pRg st="0" end="0"/>
-                                            </p:txEl>
-                                          </p:spTgt>
-                                        </p:tgtEl>
-                                      </p:cBhvr>
-                                    </p:animEffect>
-                                  </p:childTnLst>
-                                </p:cTn>
-                              </p:par>
-                            </p:childTnLst>
-                          </p:cTn>
-                        </p:par>
-                        <p:par>
-                          <p:cTn id="8" fill="hold">
-                            <p:stCondLst>
-                              <p:cond delay="1000"/>
-                            </p:stCondLst>
-                            <p:childTnLst>
-                              <p:par>
-                                <p:cTn id="9" presetID="22" presetClass="entr" presetSubtype="8" fill="hold" nodeType="afterEffect">
-                                  <p:stCondLst>
-                                    <p:cond delay="0"/>
-                                  </p:stCondLst>
-                                  <p:childTnLst>
-                                    <p:set>
-                                      <p:cBhvr>
-                                        <p:cTn id="10" dur="1" fill="hold">
-                                          <p:stCondLst>
-                                            <p:cond delay="0"/>
-                                          </p:stCondLst>
-                                        </p:cTn>
-                                        <p:tgtEl>
-                                          <p:spTgt spid="3">
-                                            <p:txEl>
-                                              <p:pRg st="1" end="1"/>
-                                            </p:txEl>
-                                          </p:spTgt>
-                                        </p:tgtEl>
-                                        <p:attrNameLst>
-                                          <p:attrName>style.visibility</p:attrName>
-                                        </p:attrNameLst>
-                                      </p:cBhvr>
-                                      <p:to>
-                                        <p:strVal val="visible"/>
-                                      </p:to>
-                                    </p:set>
-                                    <p:animEffect transition="in" filter="wipe(left)">
-                                      <p:cBhvr>
-                                        <p:cTn id="11" dur="1000"/>
-                                        <p:tgtEl>
-                                          <p:spTgt spid="3">
-                                            <p:txEl>
-                                              <p:pRg st="1" end="1"/>
-                                            </p:txEl>
-                                          </p:spTgt>
-                                        </p:tgtEl>
-                                      </p:cBhvr>
-                                    </p:animEffect>
-                                  </p:childTnLst>
-                                </p:cTn>
-                              </p:par>
-                            </p:childTnLst>
-                          </p:cTn>
-                        </p:par>
-                      </p:childTnLst>
-                    </p:cTn>
-                  </p:par>
-                  <p:par>
-                    <p:cTn id="12" fill="hold">
-                      <p:stCondLst>
-                        <p:cond delay="indefinite"/>
-                      </p:stCondLst>
-                      <p:childTnLst>
-                        <p:par>
-                          <p:cTn id="13" fill="hold">
-                            <p:stCondLst>
-                              <p:cond delay="0"/>
-                            </p:stCondLst>
-                            <p:childTnLst>
-                              <p:par>
-                                <p:cTn id="14" presetID="9" presetClass="entr" presetSubtype="0" fill="hold" nodeType="clickEffect">
-                                  <p:stCondLst>
-                                    <p:cond delay="0"/>
-                                  </p:stCondLst>
-                                  <p:childTnLst>
-                                    <p:set>
-                                      <p:cBhvr>
-                                        <p:cTn id="15" dur="1" fill="hold">
-                                          <p:stCondLst>
-                                            <p:cond delay="0"/>
-                                          </p:stCondLst>
-                                        </p:cTn>
-                                        <p:tgtEl>
-                                          <p:spTgt spid="3">
-                                            <p:txEl>
-                                              <p:pRg st="2" end="2"/>
-                                            </p:txEl>
-                                          </p:spTgt>
-                                        </p:tgtEl>
-                                        <p:attrNameLst>
-                                          <p:attrName>style.visibility</p:attrName>
-                                        </p:attrNameLst>
-                                      </p:cBhvr>
-                                      <p:to>
-                                        <p:strVal val="visible"/>
-                                      </p:to>
-                                    </p:set>
-                                    <p:animEffect transition="in" filter="dissolve">
-                                      <p:cBhvr>
-                                        <p:cTn id="16" dur="1000"/>
-                                        <p:tgtEl>
-                                          <p:spTgt spid="3">
-                                            <p:txEl>
-                                              <p:pRg st="2" end="2"/>
-                                            </p:txEl>
-                                          </p:spTgt>
-                                        </p:tgtEl>
-                                      </p:cBhvr>
-                                    </p:animEffect>
-                                  </p:childTnLst>
-                                </p:cTn>
-                              </p:par>
-                            </p:childTnLst>
-                          </p:cTn>
-                        </p:par>
-                      </p:childTnLst>
-                    </p:cTn>
-                  </p:par>
-                  <p:par>
-                    <p:cTn id="17" fill="hold">
-                      <p:stCondLst>
-                        <p:cond delay="indefinite"/>
-                      </p:stCondLst>
-                      <p:childTnLst>
-                        <p:par>
-                          <p:cTn id="18" fill="hold">
-                            <p:stCondLst>
-                              <p:cond delay="0"/>
-                            </p:stCondLst>
-                            <p:childTnLst>
-                              <p:par>
-                                <p:cTn id="19" presetID="9" presetClass="entr" presetSubtype="0" fill="hold" nodeType="clickEffect">
-                                  <p:stCondLst>
-                                    <p:cond delay="0"/>
-                                  </p:stCondLst>
-                                  <p:childTnLst>
-                                    <p:set>
-                                      <p:cBhvr>
-                                        <p:cTn id="20" dur="1" fill="hold">
-                                          <p:stCondLst>
-                                            <p:cond delay="0"/>
-                                          </p:stCondLst>
-                                        </p:cTn>
-                                        <p:tgtEl>
-                                          <p:spTgt spid="3">
-                                            <p:txEl>
-                                              <p:pRg st="3" end="3"/>
-                                            </p:txEl>
-                                          </p:spTgt>
-                                        </p:tgtEl>
-                                        <p:attrNameLst>
-                                          <p:attrName>style.visibility</p:attrName>
-                                        </p:attrNameLst>
-                                      </p:cBhvr>
-                                      <p:to>
-                                        <p:strVal val="visible"/>
-                                      </p:to>
-                                    </p:set>
-                                    <p:animEffect transition="in" filter="dissolve">
-                                      <p:cBhvr>
-                                        <p:cTn id="21" dur="1000"/>
-                                        <p:tgtEl>
-                                          <p:spTgt spid="3">
-                                            <p:txEl>
-                                              <p:pRg st="3" end="3"/>
-                                            </p:txEl>
-                                          </p:spTgt>
-                                        </p:tgtEl>
-                                      </p:cBhvr>
-                                    </p:animEffect>
-                                  </p:childTnLst>
-                                </p:cTn>
-                              </p:par>
-                            </p:childTnLst>
-                          </p:cTn>
-                        </p:par>
-                        <p:par>
-                          <p:cTn id="22" fill="hold">
-                            <p:stCondLst>
-                              <p:cond delay="1000"/>
-                            </p:stCondLst>
-                            <p:childTnLst>
-                              <p:par>
-                                <p:cTn id="23" presetID="15" presetClass="entr" presetSubtype="0" fill="hold" nodeType="afterEffect">
-                                  <p:stCondLst>
-                                    <p:cond delay="0"/>
-                                  </p:stCondLst>
-                                  <p:childTnLst>
-                                    <p:set>
-                                      <p:cBhvr>
-                                        <p:cTn id="24" dur="1" fill="hold">
-                                          <p:stCondLst>
-                                            <p:cond delay="0"/>
-                                          </p:stCondLst>
-                                        </p:cTn>
-                                        <p:tgtEl>
-                                          <p:spTgt spid="10"/>
-                                        </p:tgtEl>
-                                        <p:attrNameLst>
-                                          <p:attrName>style.visibility</p:attrName>
-                                        </p:attrNameLst>
-                                      </p:cBhvr>
-                                      <p:to>
-                                        <p:strVal val="visible"/>
-                                      </p:to>
-                                    </p:set>
-                                    <p:anim calcmode="lin" valueType="num">
-                                      <p:cBhvr>
-                                        <p:cTn id="25" dur="1000" fill="hold"/>
-                                        <p:tgtEl>
-                                          <p:spTgt spid="10"/>
-                                        </p:tgtEl>
-                                        <p:attrNameLst>
-                                          <p:attrName>ppt_w</p:attrName>
-                                        </p:attrNameLst>
-                                      </p:cBhvr>
-                                      <p:tavLst>
-                                        <p:tav tm="0">
-                                          <p:val>
-                                            <p:fltVal val="0"/>
-                                          </p:val>
-                                        </p:tav>
-                                        <p:tav tm="100000">
-                                          <p:val>
-                                            <p:strVal val="#ppt_w"/>
-                                          </p:val>
-                                        </p:tav>
-                                      </p:tavLst>
-                                    </p:anim>
-                                    <p:anim calcmode="lin" valueType="num">
-                                      <p:cBhvr>
-                                        <p:cTn id="26" dur="1000" fill="hold"/>
-                                        <p:tgtEl>
-                                          <p:spTgt spid="10"/>
-                                        </p:tgtEl>
-                                        <p:attrNameLst>
-                                          <p:attrName>ppt_h</p:attrName>
-                                        </p:attrNameLst>
-                                      </p:cBhvr>
-                                      <p:tavLst>
-                                        <p:tav tm="0">
-                                          <p:val>
-                                            <p:fltVal val="0"/>
-                                          </p:val>
-                                        </p:tav>
-                                        <p:tav tm="100000">
-                                          <p:val>
-                                            <p:strVal val="#ppt_h"/>
-                                          </p:val>
-                                        </p:tav>
-                                      </p:tavLst>
-                                    </p:anim>
-                                    <p:anim calcmode="lin" valueType="num">
-                                      <p:cBhvr>
-                                        <p:cTn id="27" dur="1000" fill="hold"/>
-                                        <p:tgtEl>
-                                          <p:spTgt spid="10"/>
-                                        </p:tgtEl>
-                                        <p:attrNameLst>
-                                          <p:attrName>ppt_x</p:attrName>
-                                        </p:attrNameLst>
-                                      </p:cBhvr>
-                                      <p:tavLst>
-                                        <p:tav tm="0" fmla="#ppt_x+(cos(-2*pi*(1-$))*-#ppt_x-sin(-2*pi*(1-$))*(1-#ppt_y))*(1-$)">
-                                          <p:val>
-                                            <p:fltVal val="0"/>
-                                          </p:val>
-                                        </p:tav>
-                                        <p:tav tm="100000">
-                                          <p:val>
-                                            <p:fltVal val="1"/>
-                                          </p:val>
-                                        </p:tav>
-                                      </p:tavLst>
-                                    </p:anim>
-                                    <p:anim calcmode="lin" valueType="num">
-                                      <p:cBhvr>
-                                        <p:cTn id="28" dur="1000" fill="hold"/>
-                                        <p:tgtEl>
-                                          <p:spTgt spid="10"/>
-                                        </p:tgtEl>
-                                        <p:attrNameLst>
-                                          <p:attrName>ppt_y</p:attrName>
-                                        </p:attrNameLst>
-                                      </p:cBhvr>
-                                      <p:tavLst>
-                                        <p:tav tm="0" fmla="#ppt_y+(sin(-2*pi*(1-$))*-#ppt_x+cos(-2*pi*(1-$))*(1-#ppt_y))*(1-$)">
-                                          <p:val>
-                                            <p:fltVal val="0"/>
-                                          </p:val>
-                                        </p:tav>
-                                        <p:tav tm="100000">
-                                          <p:val>
-                                            <p:fltVal val="1"/>
-                                          </p:val>
-                                        </p:tav>
-                                      </p:tavLst>
-                                    </p:anim>
-                                  </p:childTnLst>
-                                </p:cTn>
-                              </p:par>
-                            </p:childTnLst>
-                          </p:cTn>
-                        </p:par>
-                      </p:childTnLst>
-                    </p:cTn>
-                  </p:par>
-                </p:childTnLst>
-              </p:cTn>
-              <p:prevCondLst>
-                <p:cond evt="onPrev" delay="0">
-                  <p:tgtEl>
-                    <p:sldTgt/>
-                  </p:tgtEl>
-                </p:cond>
-              </p:prevCondLst>
-              <p:nextCondLst>
-                <p:cond evt="onNext" delay="0">
-                  <p:tgtEl>
-                    <p:sldTgt/>
-                  </p:tgtEl>
-                </p:cond>
-              </p:nextCondLst>
-            </p:seq>
-          </p:childTnLst>
-        </p:cTn>
-      </p:par>
-    </p:tnLst>
-  </p:timing>
-</p:sld>
-</file>
-
-<file path=ppt/slides/slide5.xml><?xml version="1.0" encoding="utf-8"?>
-<p:sld xmlns:a="http://schemas.openxmlformats.org/drawingml/2006/main" xmlns:r="http://schemas.openxmlformats.org/officeDocument/2006/relationships" xmlns:p="http://schemas.openxmlformats.org/presentationml/2006/main">
-  <p:cSld>
-    <p:spTree>
-      <p:nvGrpSpPr>
-        <p:cNvPr id="1" name=""/>
-        <p:cNvGrpSpPr/>
-        <p:nvPr/>
-      </p:nvGrpSpPr>
-      <p:grpSpPr>
-        <a:xfrm>
-          <a:off x="0" y="0"/>
-          <a:ext cx="0" cy="0"/>
-          <a:chOff x="0" y="0"/>
-          <a:chExt cx="0" cy="0"/>
-        </a:xfrm>
-      </p:grpSpPr>
       <p:graphicFrame>
         <p:nvGraphicFramePr>
-          <p:cNvPr id="5" name="Object 4"/>
+          <p:cNvPr id="8" name="Object 7"/>
           <p:cNvGraphicFramePr>
             <a:graphicFrameLocks noChangeAspect="1"/>
           </p:cNvGraphicFramePr>
           <p:nvPr>
             <p:extLst>
               <p:ext uri="{D42A27DB-BD31-4B8C-83A1-F6EECF244321}">
-                <p14:modId xmlns:p14="http://schemas.microsoft.com/office/powerpoint/2010/main" val="456938942"/>
+                <p14:modId xmlns:p14="http://schemas.microsoft.com/office/powerpoint/2010/main" val="3341019441"/>
               </p:ext>
             </p:extLst>
           </p:nvPr>
         </p:nvGraphicFramePr>
         <p:xfrm>
-          <a:off x="2087563" y="4705350"/>
-          <a:ext cx="5597525" cy="1881188"/>
+          <a:off x="586470" y="3681414"/>
+          <a:ext cx="7793523" cy="2087998"/>
         </p:xfrm>
         <a:graphic>
           <a:graphicData uri="http://schemas.openxmlformats.org/presentationml/2006/ole">
             <mc:AlternateContent xmlns:mc="http://schemas.openxmlformats.org/markup-compatibility/2006">
               <mc:Choice xmlns:v="urn:schemas-microsoft-com:vml" Requires="v">
-                <p:oleObj spid="_x0000_s198736" name="Equation" r:id="rId4" imgW="1549400" imgH="520700" progId="Equation.DSMT4">
+                <p:oleObj spid="_x0000_s586758" name="Equation" r:id="rId4" imgW="1943100" imgH="520700" progId="Equation.DSMT4">
                   <p:embed/>
                 </p:oleObj>
               </mc:Choice>
               <mc:Fallback>
-                <p:oleObj name="Equation" r:id="rId4" imgW="1549400" imgH="520700" progId="Equation.DSMT4">
-                  <p:embed/>
-                  <p:pic>
-                    <p:nvPicPr>
-                      <p:cNvPr id="0" name="Object 2"/>
-                      <p:cNvPicPr>
-                        <a:picLocks noChangeAspect="1" noChangeArrowheads="1"/>
-                      </p:cNvPicPr>
-                      <p:nvPr/>
-                    </p:nvPicPr>
-                    <p:blipFill>
-                      <a:blip r:embed="rId5"/>
-                      <a:srcRect/>
-                      <a:stretch>
-                        <a:fillRect/>
-                      </a:stretch>
-                    </p:blipFill>
-                    <p:spPr bwMode="auto">
-                      <a:xfrm>
-                        <a:off x="2087563" y="4705350"/>
-                        <a:ext cx="5597525" cy="1881188"/>
-                      </a:xfrm>
-                      <a:prstGeom prst="rect">
-                        <a:avLst/>
-                      </a:prstGeom>
-                      <a:noFill/>
-                      <a:extLst/>
-                    </p:spPr>
-                  </p:pic>
-                </p:oleObj>
-              </mc:Fallback>
-            </mc:AlternateContent>
-          </a:graphicData>
-        </a:graphic>
-      </p:graphicFrame>
-      <p:sp>
-        <p:nvSpPr>
-          <p:cNvPr id="4" name="Rectangle 2"/>
-          <p:cNvSpPr>
-            <a:spLocks noGrp="1" noChangeArrowheads="1"/>
-          </p:cNvSpPr>
-          <p:nvPr>
-            <p:ph type="title"/>
-          </p:nvPr>
-        </p:nvSpPr>
-        <p:spPr>
-          <a:xfrm>
-            <a:off x="1600200" y="304800"/>
-            <a:ext cx="6019800" cy="1066800"/>
-          </a:xfrm>
-        </p:spPr>
-        <p:txBody>
-          <a:bodyPr/>
-          <a:lstStyle/>
-          <a:p>
-            <a:pPr eaLnBrk="1" hangingPunct="1"/>
-            <a:r>
-              <a:rPr lang="en-US" sz="4400" dirty="0" smtClean="0">
-                <a:solidFill>
-                  <a:schemeClr val="tx1"/>
-                </a:solidFill>
-              </a:rPr>
-              <a:t>Expected #Heads</a:t>
-            </a:r>
-          </a:p>
-        </p:txBody>
-      </p:sp>
-      <p:sp>
-        <p:nvSpPr>
-          <p:cNvPr id="6" name="TextBox 5"/>
-          <p:cNvSpPr txBox="1"/>
-          <p:nvPr/>
-        </p:nvSpPr>
-        <p:spPr>
-          <a:xfrm>
-            <a:off x="729441" y="1295400"/>
-            <a:ext cx="8172430" cy="2308324"/>
-          </a:xfrm>
-          <a:prstGeom prst="rect">
-            <a:avLst/>
-          </a:prstGeom>
-          <a:noFill/>
-        </p:spPr>
-        <p:txBody>
-          <a:bodyPr wrap="none" rtlCol="0">
-            <a:spAutoFit/>
-          </a:bodyPr>
-          <a:lstStyle/>
-          <a:p>
-            <a:r>
-              <a:rPr lang="en-US" sz="4800" i="0" dirty="0" smtClean="0">
-                <a:solidFill>
-                  <a:srgbClr val="0000FF"/>
-                </a:solidFill>
-                <a:latin typeface="+mj-lt"/>
-              </a:rPr>
-              <a:t>n</a:t>
-            </a:r>
-            <a:r>
-              <a:rPr lang="en-US" sz="4800" i="0" dirty="0" smtClean="0">
-                <a:latin typeface="+mj-lt"/>
-              </a:rPr>
-              <a:t> independent flips of a</a:t>
-            </a:r>
-          </a:p>
-          <a:p>
-            <a:r>
-              <a:rPr lang="en-US" sz="4800" i="0" dirty="0" smtClean="0">
-                <a:latin typeface="+mj-lt"/>
-              </a:rPr>
-              <a:t>coin with bias </a:t>
-            </a:r>
-            <a:r>
-              <a:rPr lang="en-US" sz="4800" i="0" dirty="0" smtClean="0">
-                <a:solidFill>
-                  <a:srgbClr val="0000FF"/>
-                </a:solidFill>
-                <a:latin typeface="+mj-lt"/>
-              </a:rPr>
-              <a:t>p</a:t>
-            </a:r>
-            <a:r>
-              <a:rPr lang="en-US" sz="4800" i="0" dirty="0" smtClean="0">
-                <a:latin typeface="+mj-lt"/>
-              </a:rPr>
-              <a:t> for Heads.</a:t>
-            </a:r>
-          </a:p>
-          <a:p>
-            <a:r>
-              <a:rPr lang="en-US" sz="4800" i="0" dirty="0" smtClean="0">
-                <a:latin typeface="+mj-lt"/>
-              </a:rPr>
-              <a:t>How many Heads expected?</a:t>
-            </a:r>
-          </a:p>
-        </p:txBody>
-      </p:sp>
-      <p:graphicFrame>
-        <p:nvGraphicFramePr>
-          <p:cNvPr id="188420" name="Object 2"/>
-          <p:cNvGraphicFramePr>
-            <a:graphicFrameLocks noChangeAspect="1"/>
-          </p:cNvGraphicFramePr>
-          <p:nvPr>
-            <p:extLst>
-              <p:ext uri="{D42A27DB-BD31-4B8C-83A1-F6EECF244321}">
-                <p14:modId xmlns:p14="http://schemas.microsoft.com/office/powerpoint/2010/main" val="605522779"/>
-              </p:ext>
-            </p:extLst>
-          </p:nvPr>
-        </p:nvGraphicFramePr>
-        <p:xfrm>
-          <a:off x="973138" y="3463925"/>
-          <a:ext cx="7324725" cy="1354138"/>
-        </p:xfrm>
-        <a:graphic>
-          <a:graphicData uri="http://schemas.openxmlformats.org/presentationml/2006/ole">
-            <mc:AlternateContent xmlns:mc="http://schemas.openxmlformats.org/markup-compatibility/2006">
-              <mc:Choice xmlns:v="urn:schemas-microsoft-com:vml" Requires="v">
-                <p:oleObj spid="_x0000_s198737" name="Equation" r:id="rId6" imgW="1993900" imgH="368300" progId="Equation.DSMT4">
-                  <p:embed/>
-                </p:oleObj>
-              </mc:Choice>
-              <mc:Fallback>
-                <p:oleObj name="Equation" r:id="rId6" imgW="1993900" imgH="368300" progId="Equation.DSMT4">
-                  <p:embed/>
-                  <p:pic>
-                    <p:nvPicPr>
-                      <p:cNvPr id="0" name="Picture 3"/>
-                      <p:cNvPicPr>
-                        <a:picLocks noChangeAspect="1" noChangeArrowheads="1"/>
-                      </p:cNvPicPr>
-                      <p:nvPr/>
-                    </p:nvPicPr>
-                    <p:blipFill>
-                      <a:blip r:embed="rId7"/>
-                      <a:srcRect/>
-                      <a:stretch>
-                        <a:fillRect/>
-                      </a:stretch>
-                    </p:blipFill>
-                    <p:spPr bwMode="auto">
-                      <a:xfrm>
-                        <a:off x="973138" y="3463925"/>
-                        <a:ext cx="7324725" cy="1354138"/>
-                      </a:xfrm>
-                      <a:prstGeom prst="rect">
-                        <a:avLst/>
-                      </a:prstGeom>
-                      <a:noFill/>
-                      <a:extLst/>
-                    </p:spPr>
-                  </p:pic>
-                </p:oleObj>
-              </mc:Fallback>
-            </mc:AlternateContent>
-          </a:graphicData>
-        </a:graphic>
-      </p:graphicFrame>
-      <p:sp>
-        <p:nvSpPr>
-          <p:cNvPr id="7" name="Slide Number Placeholder 3"/>
-          <p:cNvSpPr>
-            <a:spLocks noGrp="1"/>
-          </p:cNvSpPr>
-          <p:nvPr>
-            <p:ph type="sldNum" sz="quarter" idx="4294967295"/>
-          </p:nvPr>
-        </p:nvSpPr>
-        <p:spPr>
-          <a:xfrm>
-            <a:off x="7554913" y="6577965"/>
-            <a:ext cx="1527175" cy="244475"/>
-          </a:xfrm>
-          <a:prstGeom prst="rect">
-            <a:avLst/>
-          </a:prstGeom>
-        </p:spPr>
-        <p:txBody>
-          <a:bodyPr/>
-          <a:lstStyle/>
-          <a:p>
-            <a:pPr>
-              <a:defRPr/>
-            </a:pPr>
-            <a:r>
-              <a:rPr lang="en-US" sz="1200" dirty="0" err="1">
-                <a:latin typeface="Comic Sans MS"/>
-                <a:cs typeface="Comic Sans MS"/>
-              </a:rPr>
-              <a:t>lec</a:t>
-            </a:r>
-            <a:r>
-              <a:rPr lang="en-US" sz="1200" dirty="0" smtClean="0">
-                <a:latin typeface="Comic Sans MS"/>
-                <a:cs typeface="Comic Sans MS"/>
-              </a:rPr>
-              <a:t> 12F.</a:t>
-            </a:r>
-            <a:fld id="{93DA0692-DAF7-4AFE-9BE7-E02439D3694A}" type="slidenum">
-              <a:rPr lang="en-US" sz="1200" smtClean="0">
-                <a:latin typeface="Comic Sans MS"/>
-                <a:cs typeface="Comic Sans MS"/>
-              </a:rPr>
-              <a:pPr>
-                <a:defRPr/>
-              </a:pPr>
-              <a:t>5</a:t>
-            </a:fld>
-            <a:endParaRPr lang="en-US" sz="1200" dirty="0">
-              <a:latin typeface="Comic Sans MS"/>
-              <a:cs typeface="Comic Sans MS"/>
-            </a:endParaRPr>
-          </a:p>
-        </p:txBody>
-      </p:sp>
-    </p:spTree>
-  </p:cSld>
-  <p:clrMapOvr>
-    <a:masterClrMapping/>
-  </p:clrMapOvr>
-  <p:transition xmlns:p14="http://schemas.microsoft.com/office/powerpoint/2010/main">
-    <p:fade/>
-  </p:transition>
-  <p:timing>
-    <p:tnLst>
-      <p:par>
-        <p:cTn xmlns:p14="http://schemas.microsoft.com/office/powerpoint/2010/main" id="1" dur="indefinite" restart="never" nodeType="tmRoot">
-          <p:childTnLst>
-            <p:seq concurrent="1" nextAc="seek">
-              <p:cTn id="2" dur="indefinite" nodeType="mainSeq">
-                <p:childTnLst>
-                  <p:par>
-                    <p:cTn id="3" fill="hold">
-                      <p:stCondLst>
-                        <p:cond delay="indefinite"/>
-                      </p:stCondLst>
-                      <p:childTnLst>
-                        <p:par>
-                          <p:cTn id="4" fill="hold">
-                            <p:stCondLst>
-                              <p:cond delay="0"/>
-                            </p:stCondLst>
-                            <p:childTnLst>
-                              <p:par>
-                                <p:cTn id="5" presetID="22" presetClass="entr" presetSubtype="8" fill="hold" nodeType="clickEffect">
-                                  <p:stCondLst>
-                                    <p:cond delay="0"/>
-                                  </p:stCondLst>
-                                  <p:childTnLst>
-                                    <p:set>
-                                      <p:cBhvr>
-                                        <p:cTn id="6" dur="1" fill="hold">
-                                          <p:stCondLst>
-                                            <p:cond delay="0"/>
-                                          </p:stCondLst>
-                                        </p:cTn>
-                                        <p:tgtEl>
-                                          <p:spTgt spid="188420"/>
-                                        </p:tgtEl>
-                                        <p:attrNameLst>
-                                          <p:attrName>style.visibility</p:attrName>
-                                        </p:attrNameLst>
-                                      </p:cBhvr>
-                                      <p:to>
-                                        <p:strVal val="visible"/>
-                                      </p:to>
-                                    </p:set>
-                                    <p:animEffect transition="in" filter="wipe(left)">
-                                      <p:cBhvr>
-                                        <p:cTn id="7" dur="1000"/>
-                                        <p:tgtEl>
-                                          <p:spTgt spid="188420"/>
-                                        </p:tgtEl>
-                                      </p:cBhvr>
-                                    </p:animEffect>
-                                  </p:childTnLst>
-                                </p:cTn>
-                              </p:par>
-                            </p:childTnLst>
-                          </p:cTn>
-                        </p:par>
-                      </p:childTnLst>
-                    </p:cTn>
-                  </p:par>
-                  <p:par>
-                    <p:cTn id="8" fill="hold">
-                      <p:stCondLst>
-                        <p:cond delay="indefinite"/>
-                      </p:stCondLst>
-                      <p:childTnLst>
-                        <p:par>
-                          <p:cTn id="9" fill="hold">
-                            <p:stCondLst>
-                              <p:cond delay="0"/>
-                            </p:stCondLst>
-                            <p:childTnLst>
-                              <p:par>
-                                <p:cTn id="10" presetID="22" presetClass="entr" presetSubtype="8" fill="hold" nodeType="clickEffect">
-                                  <p:stCondLst>
-                                    <p:cond delay="0"/>
-                                  </p:stCondLst>
-                                  <p:childTnLst>
-                                    <p:set>
-                                      <p:cBhvr>
-                                        <p:cTn id="11" dur="1" fill="hold">
-                                          <p:stCondLst>
-                                            <p:cond delay="0"/>
-                                          </p:stCondLst>
-                                        </p:cTn>
-                                        <p:tgtEl>
-                                          <p:spTgt spid="5"/>
-                                        </p:tgtEl>
-                                        <p:attrNameLst>
-                                          <p:attrName>style.visibility</p:attrName>
-                                        </p:attrNameLst>
-                                      </p:cBhvr>
-                                      <p:to>
-                                        <p:strVal val="visible"/>
-                                      </p:to>
-                                    </p:set>
-                                    <p:animEffect transition="in" filter="wipe(left)">
-                                      <p:cBhvr>
-                                        <p:cTn id="12" dur="1000"/>
-                                        <p:tgtEl>
-                                          <p:spTgt spid="5"/>
-                                        </p:tgtEl>
-                                      </p:cBhvr>
-                                    </p:animEffect>
-                                  </p:childTnLst>
-                                </p:cTn>
-                              </p:par>
-                            </p:childTnLst>
-                          </p:cTn>
-                        </p:par>
-                      </p:childTnLst>
-                    </p:cTn>
-                  </p:par>
-                </p:childTnLst>
-              </p:cTn>
-              <p:prevCondLst>
-                <p:cond evt="onPrev" delay="0">
-                  <p:tgtEl>
-                    <p:sldTgt/>
-                  </p:tgtEl>
-                </p:cond>
-              </p:prevCondLst>
-              <p:nextCondLst>
-                <p:cond evt="onNext" delay="0">
-                  <p:tgtEl>
-                    <p:sldTgt/>
-                  </p:tgtEl>
-                </p:cond>
-              </p:nextCondLst>
-            </p:seq>
-          </p:childTnLst>
-        </p:cTn>
-      </p:par>
-    </p:tnLst>
-  </p:timing>
-</p:sld>
-</file>
-
-<file path=ppt/slides/slide6.xml><?xml version="1.0" encoding="utf-8"?>
-<p:sld xmlns:a="http://schemas.openxmlformats.org/drawingml/2006/main" xmlns:r="http://schemas.openxmlformats.org/officeDocument/2006/relationships" xmlns:p="http://schemas.openxmlformats.org/presentationml/2006/main">
-  <p:cSld>
-    <p:spTree>
-      <p:nvGrpSpPr>
-        <p:cNvPr id="1" name=""/>
-        <p:cNvGrpSpPr/>
-        <p:nvPr/>
-      </p:nvGrpSpPr>
-      <p:grpSpPr>
-        <a:xfrm>
-          <a:off x="0" y="0"/>
-          <a:ext cx="0" cy="0"/>
-          <a:chOff x="0" y="0"/>
-          <a:chExt cx="0" cy="0"/>
-        </a:xfrm>
-      </p:grpSpPr>
-      <p:graphicFrame>
-        <p:nvGraphicFramePr>
-          <p:cNvPr id="5" name="Object 4"/>
-          <p:cNvGraphicFramePr>
-            <a:graphicFrameLocks noChangeAspect="1"/>
-          </p:cNvGraphicFramePr>
-          <p:nvPr>
-            <p:extLst>
-              <p:ext uri="{D42A27DB-BD31-4B8C-83A1-F6EECF244321}">
-                <p14:modId xmlns:p14="http://schemas.microsoft.com/office/powerpoint/2010/main" val="489738257"/>
-              </p:ext>
-            </p:extLst>
-          </p:nvPr>
-        </p:nvGraphicFramePr>
-        <p:xfrm>
-          <a:off x="2102958" y="4705350"/>
-          <a:ext cx="4725987" cy="1881188"/>
-        </p:xfrm>
-        <a:graphic>
-          <a:graphicData uri="http://schemas.openxmlformats.org/presentationml/2006/ole">
-            <mc:AlternateContent xmlns:mc="http://schemas.openxmlformats.org/markup-compatibility/2006">
-              <mc:Choice xmlns:v="urn:schemas-microsoft-com:vml" Requires="v">
-                <p:oleObj spid="_x0000_s581667" name="Equation" r:id="rId4" imgW="1308100" imgH="520700" progId="Equation.DSMT4">
-                  <p:embed/>
-                </p:oleObj>
-              </mc:Choice>
-              <mc:Fallback>
-                <p:oleObj name="Equation" r:id="rId4" imgW="1308100" imgH="520700" progId="Equation.DSMT4">
+                <p:oleObj name="Equation" r:id="rId4" imgW="1943100" imgH="520700" progId="Equation.DSMT4">
                   <p:embed/>
                   <p:pic>
                     <p:nvPicPr>
@@ -8744,230 +7568,8 @@
                     </p:blipFill>
                     <p:spPr bwMode="auto">
                       <a:xfrm>
-                        <a:off x="2102958" y="4705350"/>
-                        <a:ext cx="4725987" cy="1881188"/>
-                      </a:xfrm>
-                      <a:prstGeom prst="rect">
-                        <a:avLst/>
-                      </a:prstGeom>
-                      <a:noFill/>
-                      <a:extLst/>
-                    </p:spPr>
-                  </p:pic>
-                </p:oleObj>
-              </mc:Fallback>
-            </mc:AlternateContent>
-          </a:graphicData>
-        </a:graphic>
-      </p:graphicFrame>
-      <p:sp>
-        <p:nvSpPr>
-          <p:cNvPr id="4" name="Rectangle 2"/>
-          <p:cNvSpPr>
-            <a:spLocks noGrp="1" noChangeArrowheads="1"/>
-          </p:cNvSpPr>
-          <p:nvPr>
-            <p:ph type="title"/>
-          </p:nvPr>
-        </p:nvSpPr>
-        <p:spPr>
-          <a:xfrm>
-            <a:off x="1600200" y="304800"/>
-            <a:ext cx="6019800" cy="1066800"/>
-          </a:xfrm>
-        </p:spPr>
-        <p:txBody>
-          <a:bodyPr/>
-          <a:lstStyle/>
-          <a:p>
-            <a:pPr eaLnBrk="1" hangingPunct="1"/>
-            <a:r>
-              <a:rPr lang="en-US" sz="4400" dirty="0" smtClean="0">
-                <a:solidFill>
-                  <a:schemeClr val="tx1"/>
-                </a:solidFill>
-              </a:rPr>
-              <a:t>Expected #Heads</a:t>
-            </a:r>
-          </a:p>
-        </p:txBody>
-      </p:sp>
-      <p:sp>
-        <p:nvSpPr>
-          <p:cNvPr id="6" name="TextBox 5"/>
-          <p:cNvSpPr txBox="1"/>
-          <p:nvPr/>
-        </p:nvSpPr>
-        <p:spPr>
-          <a:xfrm>
-            <a:off x="729441" y="1295400"/>
-            <a:ext cx="8172430" cy="2308324"/>
-          </a:xfrm>
-          <a:prstGeom prst="rect">
-            <a:avLst/>
-          </a:prstGeom>
-          <a:noFill/>
-        </p:spPr>
-        <p:txBody>
-          <a:bodyPr wrap="none" rtlCol="0">
-            <a:spAutoFit/>
-          </a:bodyPr>
-          <a:lstStyle/>
-          <a:p>
-            <a:r>
-              <a:rPr lang="en-US" sz="4800" i="0" dirty="0" smtClean="0">
-                <a:solidFill>
-                  <a:srgbClr val="0000FF"/>
-                </a:solidFill>
-                <a:latin typeface="+mj-lt"/>
-              </a:rPr>
-              <a:t>n</a:t>
-            </a:r>
-            <a:r>
-              <a:rPr lang="en-US" sz="4800" i="0" dirty="0" smtClean="0">
-                <a:latin typeface="+mj-lt"/>
-              </a:rPr>
-              <a:t> independent flips of a</a:t>
-            </a:r>
-          </a:p>
-          <a:p>
-            <a:r>
-              <a:rPr lang="en-US" sz="4800" i="0" dirty="0" smtClean="0">
-                <a:latin typeface="+mj-lt"/>
-              </a:rPr>
-              <a:t>coin with bias </a:t>
-            </a:r>
-            <a:r>
-              <a:rPr lang="en-US" sz="4800" i="0" dirty="0" smtClean="0">
-                <a:solidFill>
-                  <a:srgbClr val="0000FF"/>
-                </a:solidFill>
-                <a:latin typeface="+mj-lt"/>
-              </a:rPr>
-              <a:t>p</a:t>
-            </a:r>
-            <a:r>
-              <a:rPr lang="en-US" sz="4800" i="0" dirty="0" smtClean="0">
-                <a:latin typeface="+mj-lt"/>
-              </a:rPr>
-              <a:t> for Heads.</a:t>
-            </a:r>
-          </a:p>
-          <a:p>
-            <a:r>
-              <a:rPr lang="en-US" sz="4800" i="0" dirty="0" smtClean="0">
-                <a:latin typeface="+mj-lt"/>
-              </a:rPr>
-              <a:t>How many Heads expected?</a:t>
-            </a:r>
-          </a:p>
-        </p:txBody>
-      </p:sp>
-      <p:sp>
-        <p:nvSpPr>
-          <p:cNvPr id="7" name="Slide Number Placeholder 3"/>
-          <p:cNvSpPr>
-            <a:spLocks noGrp="1"/>
-          </p:cNvSpPr>
-          <p:nvPr>
-            <p:ph type="sldNum" sz="quarter" idx="4294967295"/>
-          </p:nvPr>
-        </p:nvSpPr>
-        <p:spPr>
-          <a:xfrm>
-            <a:off x="7554913" y="6577965"/>
-            <a:ext cx="1527175" cy="244475"/>
-          </a:xfrm>
-          <a:prstGeom prst="rect">
-            <a:avLst/>
-          </a:prstGeom>
-        </p:spPr>
-        <p:txBody>
-          <a:bodyPr/>
-          <a:lstStyle/>
-          <a:p>
-            <a:pPr>
-              <a:defRPr/>
-            </a:pPr>
-            <a:r>
-              <a:rPr lang="en-US" sz="1200" dirty="0" err="1">
-                <a:latin typeface="Comic Sans MS"/>
-                <a:cs typeface="Comic Sans MS"/>
-              </a:rPr>
-              <a:t>lec</a:t>
-            </a:r>
-            <a:r>
-              <a:rPr lang="en-US" sz="1200" dirty="0" smtClean="0">
-                <a:latin typeface="Comic Sans MS"/>
-                <a:cs typeface="Comic Sans MS"/>
-              </a:rPr>
-              <a:t> 12F.</a:t>
-            </a:r>
-            <a:fld id="{93DA0692-DAF7-4AFE-9BE7-E02439D3694A}" type="slidenum">
-              <a:rPr lang="en-US" sz="1200" smtClean="0">
-                <a:latin typeface="Comic Sans MS"/>
-                <a:cs typeface="Comic Sans MS"/>
-              </a:rPr>
-              <a:pPr>
-                <a:defRPr/>
-              </a:pPr>
-              <a:t>6</a:t>
-            </a:fld>
-            <a:endParaRPr lang="en-US" sz="1200" dirty="0">
-              <a:latin typeface="Comic Sans MS"/>
-              <a:cs typeface="Comic Sans MS"/>
-            </a:endParaRPr>
-          </a:p>
-        </p:txBody>
-      </p:sp>
-      <p:graphicFrame>
-        <p:nvGraphicFramePr>
-          <p:cNvPr id="8" name="Object 2"/>
-          <p:cNvGraphicFramePr>
-            <a:graphicFrameLocks noChangeAspect="1"/>
-          </p:cNvGraphicFramePr>
-          <p:nvPr>
-            <p:extLst>
-              <p:ext uri="{D42A27DB-BD31-4B8C-83A1-F6EECF244321}">
-                <p14:modId xmlns:p14="http://schemas.microsoft.com/office/powerpoint/2010/main" val="673345839"/>
-              </p:ext>
-            </p:extLst>
-          </p:nvPr>
-        </p:nvGraphicFramePr>
-        <p:xfrm>
-          <a:off x="973138" y="3463925"/>
-          <a:ext cx="7324725" cy="1354138"/>
-        </p:xfrm>
-        <a:graphic>
-          <a:graphicData uri="http://schemas.openxmlformats.org/presentationml/2006/ole">
-            <mc:AlternateContent xmlns:mc="http://schemas.openxmlformats.org/markup-compatibility/2006">
-              <mc:Choice xmlns:v="urn:schemas-microsoft-com:vml" Requires="v">
-                <p:oleObj spid="_x0000_s581668" name="Equation" r:id="rId6" imgW="1993900" imgH="368300" progId="Equation.DSMT4">
-                  <p:embed/>
-                </p:oleObj>
-              </mc:Choice>
-              <mc:Fallback>
-                <p:oleObj name="Equation" r:id="rId6" imgW="1993900" imgH="368300" progId="Equation.DSMT4">
-                  <p:embed/>
-                  <p:pic>
-                    <p:nvPicPr>
-                      <p:cNvPr id="0" name=""/>
-                      <p:cNvPicPr>
-                        <a:picLocks noChangeAspect="1" noChangeArrowheads="1"/>
-                      </p:cNvPicPr>
-                      <p:nvPr/>
-                    </p:nvPicPr>
-                    <p:blipFill>
-                      <a:blip r:embed="rId7"/>
-                      <a:srcRect/>
-                      <a:stretch>
-                        <a:fillRect/>
-                      </a:stretch>
-                    </p:blipFill>
-                    <p:spPr bwMode="auto">
-                      <a:xfrm>
-                        <a:off x="973138" y="3463925"/>
-                        <a:ext cx="7324725" cy="1354138"/>
+                        <a:off x="586470" y="3681414"/>
+                        <a:ext cx="7793523" cy="2087998"/>
                       </a:xfrm>
                       <a:prstGeom prst="rect">
                         <a:avLst/>
@@ -8985,7 +7587,7 @@
     </p:spTree>
     <p:extLst>
       <p:ext uri="{BB962C8B-B14F-4D97-AF65-F5344CB8AC3E}">
-        <p14:creationId xmlns:p14="http://schemas.microsoft.com/office/powerpoint/2010/main" val="3769079348"/>
+        <p14:creationId xmlns:p14="http://schemas.microsoft.com/office/powerpoint/2010/main" val="3711786946"/>
       </p:ext>
     </p:extLst>
   </p:cSld>
@@ -9014,7 +7616,7 @@
 </p:sld>
 </file>
 
-<file path=ppt/slides/slide7.xml><?xml version="1.0" encoding="utf-8"?>
+<file path=ppt/slides/slide5.xml><?xml version="1.0" encoding="utf-8"?>
 <p:sld xmlns:a="http://schemas.openxmlformats.org/drawingml/2006/main" xmlns:r="http://schemas.openxmlformats.org/officeDocument/2006/relationships" xmlns:p="http://schemas.openxmlformats.org/presentationml/2006/main">
   <p:cSld>
     <p:spTree>
@@ -9031,34 +7633,200 @@
           <a:chExt cx="0" cy="0"/>
         </a:xfrm>
       </p:grpSpPr>
+      <p:sp>
+        <p:nvSpPr>
+          <p:cNvPr id="4" name="Rectangle 2"/>
+          <p:cNvSpPr>
+            <a:spLocks noGrp="1" noChangeArrowheads="1"/>
+          </p:cNvSpPr>
+          <p:nvPr>
+            <p:ph type="title"/>
+          </p:nvPr>
+        </p:nvSpPr>
+        <p:spPr>
+          <a:xfrm>
+            <a:off x="1600200" y="304800"/>
+            <a:ext cx="6019800" cy="1066800"/>
+          </a:xfrm>
+        </p:spPr>
+        <p:txBody>
+          <a:bodyPr/>
+          <a:lstStyle/>
+          <a:p>
+            <a:pPr eaLnBrk="1" hangingPunct="1"/>
+            <a:r>
+              <a:rPr lang="en-US" sz="4400" dirty="0" smtClean="0">
+                <a:solidFill>
+                  <a:schemeClr val="tx1"/>
+                </a:solidFill>
+              </a:rPr>
+              <a:t>Expected #Heads</a:t>
+            </a:r>
+          </a:p>
+        </p:txBody>
+      </p:sp>
+      <p:sp>
+        <p:nvSpPr>
+          <p:cNvPr id="6" name="TextBox 5"/>
+          <p:cNvSpPr txBox="1"/>
+          <p:nvPr/>
+        </p:nvSpPr>
+        <p:spPr>
+          <a:xfrm>
+            <a:off x="510284" y="1281445"/>
+            <a:ext cx="8389783" cy="2308324"/>
+          </a:xfrm>
+          <a:prstGeom prst="rect">
+            <a:avLst/>
+          </a:prstGeom>
+          <a:noFill/>
+        </p:spPr>
+        <p:txBody>
+          <a:bodyPr wrap="square" rtlCol="0">
+            <a:spAutoFit/>
+          </a:bodyPr>
+          <a:lstStyle/>
+          <a:p>
+            <a:r>
+              <a:rPr lang="en-US" sz="4800" i="0" dirty="0" smtClean="0">
+                <a:solidFill>
+                  <a:srgbClr val="0000FF"/>
+                </a:solidFill>
+                <a:latin typeface="+mj-lt"/>
+              </a:rPr>
+              <a:t>n</a:t>
+            </a:r>
+            <a:r>
+              <a:rPr lang="en-US" sz="4800" i="0" dirty="0" smtClean="0">
+                <a:latin typeface="+mj-lt"/>
+              </a:rPr>
+              <a:t> independent flips of a</a:t>
+            </a:r>
+          </a:p>
+          <a:p>
+            <a:r>
+              <a:rPr lang="en-US" sz="4800" i="0" dirty="0" smtClean="0">
+                <a:latin typeface="+mj-lt"/>
+              </a:rPr>
+              <a:t>coin with bias </a:t>
+            </a:r>
+            <a:r>
+              <a:rPr lang="en-US" sz="4800" i="0" dirty="0" smtClean="0">
+                <a:solidFill>
+                  <a:srgbClr val="0000FF"/>
+                </a:solidFill>
+                <a:latin typeface="+mj-lt"/>
+              </a:rPr>
+              <a:t>p</a:t>
+            </a:r>
+            <a:r>
+              <a:rPr lang="en-US" sz="4800" i="0" dirty="0" smtClean="0">
+                <a:latin typeface="+mj-lt"/>
+              </a:rPr>
+              <a:t> for Heads.</a:t>
+            </a:r>
+          </a:p>
+          <a:p>
+            <a:r>
+              <a:rPr lang="en-US" sz="4800" i="0" dirty="0" smtClean="0">
+                <a:latin typeface="+mj-lt"/>
+              </a:rPr>
+              <a:t>How many Heads expected?</a:t>
+            </a:r>
+            <a:endParaRPr lang="en-US" sz="4800" dirty="0" smtClean="0">
+              <a:solidFill>
+                <a:srgbClr val="3333FF"/>
+              </a:solidFill>
+              <a:latin typeface="+mj-lt"/>
+            </a:endParaRPr>
+          </a:p>
+        </p:txBody>
+      </p:sp>
+      <p:sp>
+        <p:nvSpPr>
+          <p:cNvPr id="7" name="Slide Number Placeholder 3"/>
+          <p:cNvSpPr>
+            <a:spLocks noGrp="1"/>
+          </p:cNvSpPr>
+          <p:nvPr>
+            <p:ph type="sldNum" sz="quarter" idx="4294967295"/>
+          </p:nvPr>
+        </p:nvSpPr>
+        <p:spPr>
+          <a:xfrm>
+            <a:off x="7554913" y="6577965"/>
+            <a:ext cx="1527175" cy="244475"/>
+          </a:xfrm>
+          <a:prstGeom prst="rect">
+            <a:avLst/>
+          </a:prstGeom>
+        </p:spPr>
+        <p:txBody>
+          <a:bodyPr/>
+          <a:lstStyle/>
+          <a:p>
+            <a:pPr>
+              <a:defRPr/>
+            </a:pPr>
+            <a:r>
+              <a:rPr lang="en-US" sz="1200" dirty="0" err="1">
+                <a:latin typeface="Comic Sans MS"/>
+                <a:cs typeface="Comic Sans MS"/>
+              </a:rPr>
+              <a:t>lec</a:t>
+            </a:r>
+            <a:r>
+              <a:rPr lang="en-US" sz="1200" dirty="0" smtClean="0">
+                <a:latin typeface="Comic Sans MS"/>
+                <a:cs typeface="Comic Sans MS"/>
+              </a:rPr>
+              <a:t> 12F.</a:t>
+            </a:r>
+            <a:fld id="{93DA0692-DAF7-4AFE-9BE7-E02439D3694A}" type="slidenum">
+              <a:rPr lang="en-US" sz="1200" smtClean="0">
+                <a:latin typeface="Comic Sans MS"/>
+                <a:cs typeface="Comic Sans MS"/>
+              </a:rPr>
+              <a:pPr>
+                <a:defRPr/>
+              </a:pPr>
+              <a:t>5</a:t>
+            </a:fld>
+            <a:endParaRPr lang="en-US" sz="1200" dirty="0">
+              <a:latin typeface="Comic Sans MS"/>
+              <a:cs typeface="Comic Sans MS"/>
+            </a:endParaRPr>
+          </a:p>
+        </p:txBody>
+      </p:sp>
       <p:graphicFrame>
         <p:nvGraphicFramePr>
-          <p:cNvPr id="5" name="Object 4"/>
+          <p:cNvPr id="8" name="Object 7"/>
           <p:cNvGraphicFramePr>
             <a:graphicFrameLocks noChangeAspect="1"/>
           </p:cNvGraphicFramePr>
           <p:nvPr>
             <p:extLst>
               <p:ext uri="{D42A27DB-BD31-4B8C-83A1-F6EECF244321}">
-                <p14:modId xmlns:p14="http://schemas.microsoft.com/office/powerpoint/2010/main" val="1360057611"/>
+                <p14:modId xmlns:p14="http://schemas.microsoft.com/office/powerpoint/2010/main" val="815501455"/>
               </p:ext>
             </p:extLst>
           </p:nvPr>
         </p:nvGraphicFramePr>
         <p:xfrm>
-          <a:off x="2102958" y="4705350"/>
-          <a:ext cx="4725987" cy="1881188"/>
+          <a:off x="593256" y="3681412"/>
+          <a:ext cx="6621463" cy="2087562"/>
         </p:xfrm>
         <a:graphic>
           <a:graphicData uri="http://schemas.openxmlformats.org/presentationml/2006/ole">
             <mc:AlternateContent xmlns:mc="http://schemas.openxmlformats.org/markup-compatibility/2006">
               <mc:Choice xmlns:v="urn:schemas-microsoft-com:vml" Requires="v">
-                <p:oleObj spid="_x0000_s582693" name="Equation" r:id="rId4" imgW="1308100" imgH="520700" progId="Equation.DSMT4">
+                <p:oleObj spid="_x0000_s587782" name="Equation" r:id="rId4" imgW="1651000" imgH="520700" progId="Equation.DSMT4">
                   <p:embed/>
                 </p:oleObj>
               </mc:Choice>
               <mc:Fallback>
-                <p:oleObj name="Equation" r:id="rId4" imgW="1308100" imgH="520700" progId="Equation.DSMT4">
+                <p:oleObj name="Equation" r:id="rId4" imgW="1651000" imgH="520700" progId="Equation.DSMT4">
                   <p:embed/>
                   <p:pic>
                     <p:nvPicPr>
@@ -9077,230 +7845,8 @@
                     </p:blipFill>
                     <p:spPr bwMode="auto">
                       <a:xfrm>
-                        <a:off x="2102958" y="4705350"/>
-                        <a:ext cx="4725987" cy="1881188"/>
-                      </a:xfrm>
-                      <a:prstGeom prst="rect">
-                        <a:avLst/>
-                      </a:prstGeom>
-                      <a:noFill/>
-                      <a:extLst/>
-                    </p:spPr>
-                  </p:pic>
-                </p:oleObj>
-              </mc:Fallback>
-            </mc:AlternateContent>
-          </a:graphicData>
-        </a:graphic>
-      </p:graphicFrame>
-      <p:sp>
-        <p:nvSpPr>
-          <p:cNvPr id="4" name="Rectangle 2"/>
-          <p:cNvSpPr>
-            <a:spLocks noGrp="1" noChangeArrowheads="1"/>
-          </p:cNvSpPr>
-          <p:nvPr>
-            <p:ph type="title"/>
-          </p:nvPr>
-        </p:nvSpPr>
-        <p:spPr>
-          <a:xfrm>
-            <a:off x="1600200" y="304800"/>
-            <a:ext cx="6019800" cy="1066800"/>
-          </a:xfrm>
-        </p:spPr>
-        <p:txBody>
-          <a:bodyPr/>
-          <a:lstStyle/>
-          <a:p>
-            <a:pPr eaLnBrk="1" hangingPunct="1"/>
-            <a:r>
-              <a:rPr lang="en-US" sz="4400" dirty="0" smtClean="0">
-                <a:solidFill>
-                  <a:schemeClr val="tx1"/>
-                </a:solidFill>
-              </a:rPr>
-              <a:t>Expected #Heads</a:t>
-            </a:r>
-          </a:p>
-        </p:txBody>
-      </p:sp>
-      <p:sp>
-        <p:nvSpPr>
-          <p:cNvPr id="7" name="Slide Number Placeholder 3"/>
-          <p:cNvSpPr>
-            <a:spLocks noGrp="1"/>
-          </p:cNvSpPr>
-          <p:nvPr>
-            <p:ph type="sldNum" sz="quarter" idx="4294967295"/>
-          </p:nvPr>
-        </p:nvSpPr>
-        <p:spPr>
-          <a:xfrm>
-            <a:off x="7554913" y="6577965"/>
-            <a:ext cx="1527175" cy="244475"/>
-          </a:xfrm>
-          <a:prstGeom prst="rect">
-            <a:avLst/>
-          </a:prstGeom>
-        </p:spPr>
-        <p:txBody>
-          <a:bodyPr/>
-          <a:lstStyle/>
-          <a:p>
-            <a:pPr>
-              <a:defRPr/>
-            </a:pPr>
-            <a:r>
-              <a:rPr lang="en-US" sz="1200" dirty="0" err="1">
-                <a:latin typeface="Comic Sans MS"/>
-                <a:cs typeface="Comic Sans MS"/>
-              </a:rPr>
-              <a:t>lec</a:t>
-            </a:r>
-            <a:r>
-              <a:rPr lang="en-US" sz="1200" dirty="0" smtClean="0">
-                <a:latin typeface="Comic Sans MS"/>
-                <a:cs typeface="Comic Sans MS"/>
-              </a:rPr>
-              <a:t> 12F.</a:t>
-            </a:r>
-            <a:fld id="{93DA0692-DAF7-4AFE-9BE7-E02439D3694A}" type="slidenum">
-              <a:rPr lang="en-US" sz="1200" smtClean="0">
-                <a:latin typeface="Comic Sans MS"/>
-                <a:cs typeface="Comic Sans MS"/>
-              </a:rPr>
-              <a:pPr>
-                <a:defRPr/>
-              </a:pPr>
-              <a:t>7</a:t>
-            </a:fld>
-            <a:endParaRPr lang="en-US" sz="1200" dirty="0">
-              <a:latin typeface="Comic Sans MS"/>
-              <a:cs typeface="Comic Sans MS"/>
-            </a:endParaRPr>
-          </a:p>
-        </p:txBody>
-      </p:sp>
-      <p:sp>
-        <p:nvSpPr>
-          <p:cNvPr id="8" name="TextBox 7"/>
-          <p:cNvSpPr txBox="1"/>
-          <p:nvPr/>
-        </p:nvSpPr>
-        <p:spPr>
-          <a:xfrm>
-            <a:off x="417872" y="1295400"/>
-            <a:ext cx="8279446" cy="2135188"/>
-          </a:xfrm>
-          <a:prstGeom prst="rect">
-            <a:avLst/>
-          </a:prstGeom>
-          <a:noFill/>
-        </p:spPr>
-        <p:txBody>
-          <a:bodyPr wrap="square" rtlCol="0">
-            <a:spAutoFit/>
-          </a:bodyPr>
-          <a:lstStyle/>
-          <a:p>
-            <a:r>
-              <a:rPr lang="en-US" sz="4400" i="0" dirty="0" smtClean="0">
-                <a:latin typeface="+mj-lt"/>
-              </a:rPr>
-              <a:t>Binomial </a:t>
-            </a:r>
-            <a:r>
-              <a:rPr lang="en-US" sz="4400" i="0" dirty="0" err="1" smtClean="0">
-                <a:latin typeface="+mj-lt"/>
-              </a:rPr>
-              <a:t>thm</a:t>
-            </a:r>
-            <a:r>
-              <a:rPr lang="en-US" sz="4400" i="0" dirty="0" smtClean="0">
-                <a:latin typeface="+mj-lt"/>
-              </a:rPr>
-              <a:t> &amp; differentiating</a:t>
-            </a:r>
-          </a:p>
-          <a:p>
-            <a:r>
-              <a:rPr lang="en-US" sz="4400" dirty="0" smtClean="0">
-                <a:latin typeface="+mj-lt"/>
-              </a:rPr>
-              <a:t>gives a closed </a:t>
-            </a:r>
-            <a:r>
-              <a:rPr lang="en-US" sz="4400" i="0" dirty="0" smtClean="0">
-                <a:latin typeface="+mj-lt"/>
-              </a:rPr>
-              <a:t>formula</a:t>
-            </a:r>
-            <a:endParaRPr lang="en-US" sz="4400" dirty="0" smtClean="0">
-              <a:latin typeface="+mj-lt"/>
-            </a:endParaRPr>
-          </a:p>
-          <a:p>
-            <a:r>
-              <a:rPr lang="en-US" sz="4400" dirty="0" smtClean="0">
-                <a:latin typeface="+mj-lt"/>
-              </a:rPr>
-              <a:t>(simpler approach later) </a:t>
-            </a:r>
-            <a:endParaRPr lang="en-US" sz="4400" i="0" dirty="0" smtClean="0">
-              <a:latin typeface="+mj-lt"/>
-            </a:endParaRPr>
-          </a:p>
-        </p:txBody>
-      </p:sp>
-      <p:graphicFrame>
-        <p:nvGraphicFramePr>
-          <p:cNvPr id="9" name="Object 2"/>
-          <p:cNvGraphicFramePr>
-            <a:graphicFrameLocks noChangeAspect="1"/>
-          </p:cNvGraphicFramePr>
-          <p:nvPr>
-            <p:extLst>
-              <p:ext uri="{D42A27DB-BD31-4B8C-83A1-F6EECF244321}">
-                <p14:modId xmlns:p14="http://schemas.microsoft.com/office/powerpoint/2010/main" val="673345839"/>
-              </p:ext>
-            </p:extLst>
-          </p:nvPr>
-        </p:nvGraphicFramePr>
-        <p:xfrm>
-          <a:off x="973138" y="3463925"/>
-          <a:ext cx="7324725" cy="1354138"/>
-        </p:xfrm>
-        <a:graphic>
-          <a:graphicData uri="http://schemas.openxmlformats.org/presentationml/2006/ole">
-            <mc:AlternateContent xmlns:mc="http://schemas.openxmlformats.org/markup-compatibility/2006">
-              <mc:Choice xmlns:v="urn:schemas-microsoft-com:vml" Requires="v">
-                <p:oleObj spid="_x0000_s582694" name="Equation" r:id="rId6" imgW="1993900" imgH="368300" progId="Equation.DSMT4">
-                  <p:embed/>
-                </p:oleObj>
-              </mc:Choice>
-              <mc:Fallback>
-                <p:oleObj name="Equation" r:id="rId6" imgW="1993900" imgH="368300" progId="Equation.DSMT4">
-                  <p:embed/>
-                  <p:pic>
-                    <p:nvPicPr>
-                      <p:cNvPr id="0" name=""/>
-                      <p:cNvPicPr>
-                        <a:picLocks noChangeAspect="1" noChangeArrowheads="1"/>
-                      </p:cNvPicPr>
-                      <p:nvPr/>
-                    </p:nvPicPr>
-                    <p:blipFill>
-                      <a:blip r:embed="rId7"/>
-                      <a:srcRect/>
-                      <a:stretch>
-                        <a:fillRect/>
-                      </a:stretch>
-                    </p:blipFill>
-                    <p:spPr bwMode="auto">
-                      <a:xfrm>
-                        <a:off x="973138" y="3463925"/>
-                        <a:ext cx="7324725" cy="1354138"/>
+                        <a:off x="593256" y="3681412"/>
+                        <a:ext cx="6621463" cy="2087562"/>
                       </a:xfrm>
                       <a:prstGeom prst="rect">
                         <a:avLst/>
@@ -9318,16 +7864,25 @@
     </p:spTree>
     <p:extLst>
       <p:ext uri="{BB962C8B-B14F-4D97-AF65-F5344CB8AC3E}">
-        <p14:creationId xmlns:p14="http://schemas.microsoft.com/office/powerpoint/2010/main" val="2570602897"/>
+        <p14:creationId xmlns:p14="http://schemas.microsoft.com/office/powerpoint/2010/main" val="1622753090"/>
       </p:ext>
     </p:extLst>
   </p:cSld>
   <p:clrMapOvr>
     <a:masterClrMapping/>
   </p:clrMapOvr>
-  <p:transition xmlns:p14="http://schemas.microsoft.com/office/powerpoint/2010/main" spd="slow">
-    <p:fade/>
-  </p:transition>
+  <mc:AlternateContent xmlns:mc="http://schemas.openxmlformats.org/markup-compatibility/2006" xmlns:p14="http://schemas.microsoft.com/office/powerpoint/2010/main">
+    <mc:Choice Requires="p14">
+      <p:transition p14:dur="400">
+        <p:fade/>
+      </p:transition>
+    </mc:Choice>
+    <mc:Fallback xmlns="">
+      <p:transition xmlns:p14="http://schemas.microsoft.com/office/powerpoint/2010/main">
+        <p:fade/>
+      </p:transition>
+    </mc:Fallback>
+  </mc:AlternateContent>
   <p:timing>
     <p:tnLst>
       <p:par>
@@ -9338,7 +7893,7 @@
 </p:sld>
 </file>
 
-<file path=ppt/slides/slide8.xml><?xml version="1.0" encoding="utf-8"?>
+<file path=ppt/slides/slide6.xml><?xml version="1.0" encoding="utf-8"?>
 <p:sld xmlns:a="http://schemas.openxmlformats.org/drawingml/2006/main" xmlns:r="http://schemas.openxmlformats.org/officeDocument/2006/relationships" xmlns:p="http://schemas.openxmlformats.org/presentationml/2006/main">
   <p:cSld>
     <p:spTree>
@@ -9365,6 +7920,181 @@
             <p:ph type="title"/>
           </p:nvPr>
         </p:nvSpPr>
+        <p:spPr>
+          <a:xfrm>
+            <a:off x="1600200" y="304800"/>
+            <a:ext cx="6019800" cy="1066800"/>
+          </a:xfrm>
+        </p:spPr>
+        <p:txBody>
+          <a:bodyPr/>
+          <a:lstStyle/>
+          <a:p>
+            <a:pPr eaLnBrk="1" hangingPunct="1"/>
+            <a:r>
+              <a:rPr lang="en-US" sz="4400" dirty="0" smtClean="0">
+                <a:solidFill>
+                  <a:schemeClr val="tx1"/>
+                </a:solidFill>
+              </a:rPr>
+              <a:t>Expected #Heads</a:t>
+            </a:r>
+          </a:p>
+        </p:txBody>
+      </p:sp>
+      <p:sp>
+        <p:nvSpPr>
+          <p:cNvPr id="7" name="Slide Number Placeholder 3"/>
+          <p:cNvSpPr>
+            <a:spLocks noGrp="1"/>
+          </p:cNvSpPr>
+          <p:nvPr>
+            <p:ph type="sldNum" sz="quarter" idx="4294967295"/>
+          </p:nvPr>
+        </p:nvSpPr>
+        <p:spPr>
+          <a:xfrm>
+            <a:off x="7554913" y="6577965"/>
+            <a:ext cx="1527175" cy="244475"/>
+          </a:xfrm>
+          <a:prstGeom prst="rect">
+            <a:avLst/>
+          </a:prstGeom>
+        </p:spPr>
+        <p:txBody>
+          <a:bodyPr/>
+          <a:lstStyle/>
+          <a:p>
+            <a:pPr>
+              <a:defRPr/>
+            </a:pPr>
+            <a:r>
+              <a:rPr lang="en-US" sz="1200" dirty="0" err="1">
+                <a:latin typeface="Comic Sans MS"/>
+                <a:cs typeface="Comic Sans MS"/>
+              </a:rPr>
+              <a:t>lec</a:t>
+            </a:r>
+            <a:r>
+              <a:rPr lang="en-US" sz="1200" dirty="0" smtClean="0">
+                <a:latin typeface="Comic Sans MS"/>
+                <a:cs typeface="Comic Sans MS"/>
+              </a:rPr>
+              <a:t> 12F.</a:t>
+            </a:r>
+            <a:fld id="{93DA0692-DAF7-4AFE-9BE7-E02439D3694A}" type="slidenum">
+              <a:rPr lang="en-US" sz="1200" smtClean="0">
+                <a:latin typeface="Comic Sans MS"/>
+                <a:cs typeface="Comic Sans MS"/>
+              </a:rPr>
+              <a:pPr>
+                <a:defRPr/>
+              </a:pPr>
+              <a:t>6</a:t>
+            </a:fld>
+            <a:endParaRPr lang="en-US" sz="1200" dirty="0">
+              <a:latin typeface="Comic Sans MS"/>
+              <a:cs typeface="Comic Sans MS"/>
+            </a:endParaRPr>
+          </a:p>
+        </p:txBody>
+      </p:sp>
+      <p:sp>
+        <p:nvSpPr>
+          <p:cNvPr id="8" name="TextBox 7"/>
+          <p:cNvSpPr txBox="1"/>
+          <p:nvPr/>
+        </p:nvSpPr>
+        <p:spPr>
+          <a:xfrm>
+            <a:off x="440554" y="2044263"/>
+            <a:ext cx="8290969" cy="2585323"/>
+          </a:xfrm>
+          <a:prstGeom prst="rect">
+            <a:avLst/>
+          </a:prstGeom>
+          <a:noFill/>
+        </p:spPr>
+        <p:txBody>
+          <a:bodyPr wrap="square" rtlCol="0">
+            <a:spAutoFit/>
+          </a:bodyPr>
+          <a:lstStyle/>
+          <a:p>
+            <a:r>
+              <a:rPr lang="en-US" sz="5400" i="0" dirty="0" smtClean="0">
+                <a:latin typeface="+mj-lt"/>
+              </a:rPr>
+              <a:t>Binomial theorem and differentiating </a:t>
+            </a:r>
+            <a:r>
+              <a:rPr lang="en-US" sz="5400" dirty="0" smtClean="0">
+                <a:latin typeface="+mj-lt"/>
+              </a:rPr>
+              <a:t>gives a closed </a:t>
+            </a:r>
+            <a:r>
+              <a:rPr lang="en-US" sz="5400" i="0" dirty="0" smtClean="0">
+                <a:latin typeface="+mj-lt"/>
+              </a:rPr>
+              <a:t>formula</a:t>
+            </a:r>
+            <a:endParaRPr lang="en-US" sz="5400" dirty="0" smtClean="0">
+              <a:latin typeface="+mj-lt"/>
+            </a:endParaRPr>
+          </a:p>
+        </p:txBody>
+      </p:sp>
+    </p:spTree>
+    <p:extLst>
+      <p:ext uri="{BB962C8B-B14F-4D97-AF65-F5344CB8AC3E}">
+        <p14:creationId xmlns:p14="http://schemas.microsoft.com/office/powerpoint/2010/main" val="2570602897"/>
+      </p:ext>
+    </p:extLst>
+  </p:cSld>
+  <p:clrMapOvr>
+    <a:masterClrMapping/>
+  </p:clrMapOvr>
+  <p:transition xmlns:p14="http://schemas.microsoft.com/office/powerpoint/2010/main" spd="slow" advClick="0">
+    <p:fade/>
+  </p:transition>
+  <p:timing>
+    <p:tnLst>
+      <p:par>
+        <p:cTn xmlns:p14="http://schemas.microsoft.com/office/powerpoint/2010/main" id="1" dur="indefinite" restart="never" nodeType="tmRoot"/>
+      </p:par>
+    </p:tnLst>
+  </p:timing>
+</p:sld>
+</file>
+
+<file path=ppt/slides/slide7.xml><?xml version="1.0" encoding="utf-8"?>
+<p:sld xmlns:a="http://schemas.openxmlformats.org/drawingml/2006/main" xmlns:r="http://schemas.openxmlformats.org/officeDocument/2006/relationships" xmlns:p="http://schemas.openxmlformats.org/presentationml/2006/main">
+  <p:cSld>
+    <p:spTree>
+      <p:nvGrpSpPr>
+        <p:cNvPr id="1" name=""/>
+        <p:cNvGrpSpPr/>
+        <p:nvPr/>
+      </p:nvGrpSpPr>
+      <p:grpSpPr>
+        <a:xfrm>
+          <a:off x="0" y="0"/>
+          <a:ext cx="0" cy="0"/>
+          <a:chOff x="0" y="0"/>
+          <a:chExt cx="0" cy="0"/>
+        </a:xfrm>
+      </p:grpSpPr>
+      <p:sp>
+        <p:nvSpPr>
+          <p:cNvPr id="4" name="Rectangle 2"/>
+          <p:cNvSpPr>
+            <a:spLocks noGrp="1" noChangeArrowheads="1"/>
+          </p:cNvSpPr>
+          <p:nvPr>
+            <p:ph type="title"/>
+          </p:nvPr>
+        </p:nvSpPr>
         <p:spPr/>
         <p:txBody>
           <a:bodyPr/>
@@ -9391,25 +8121,25 @@
           <p:nvPr>
             <p:extLst>
               <p:ext uri="{D42A27DB-BD31-4B8C-83A1-F6EECF244321}">
-                <p14:modId xmlns:p14="http://schemas.microsoft.com/office/powerpoint/2010/main" val="572089636"/>
+                <p14:modId xmlns:p14="http://schemas.microsoft.com/office/powerpoint/2010/main" val="1437353004"/>
               </p:ext>
             </p:extLst>
           </p:nvPr>
         </p:nvGraphicFramePr>
         <p:xfrm>
-          <a:off x="1157940" y="1143000"/>
-          <a:ext cx="5993127" cy="1981200"/>
+          <a:off x="1866440" y="1119188"/>
+          <a:ext cx="6094413" cy="2030412"/>
         </p:xfrm>
         <a:graphic>
           <a:graphicData uri="http://schemas.openxmlformats.org/presentationml/2006/ole">
             <mc:AlternateContent xmlns:mc="http://schemas.openxmlformats.org/markup-compatibility/2006">
               <mc:Choice xmlns:v="urn:schemas-microsoft-com:vml" Requires="v">
-                <p:oleObj spid="_x0000_s200822" name="Equation" r:id="rId4" imgW="1536480" imgH="507960" progId="Equation.DSMT4">
+                <p:oleObj spid="_x0000_s200851" name="Equation" r:id="rId4" imgW="1562100" imgH="520700" progId="Equation.DSMT4">
                   <p:embed/>
                 </p:oleObj>
               </mc:Choice>
               <mc:Fallback>
-                <p:oleObj name="Equation" r:id="rId4" imgW="1536480" imgH="507960" progId="Equation.DSMT4">
+                <p:oleObj name="Equation" r:id="rId4" imgW="1562100" imgH="520700" progId="Equation.DSMT4">
                   <p:embed/>
                   <p:pic>
                     <p:nvPicPr>
@@ -9420,13 +8150,7 @@
                       <p:nvPr/>
                     </p:nvPicPr>
                     <p:blipFill>
-                      <a:blip r:embed="rId5">
-                        <a:extLst>
-                          <a:ext uri="{28A0092B-C50C-407E-A947-70E740481C1C}">
-                            <a14:useLocalDpi xmlns:a14="http://schemas.microsoft.com/office/drawing/2010/main" val="0"/>
-                          </a:ext>
-                        </a:extLst>
-                      </a:blip>
+                      <a:blip r:embed="rId5"/>
                       <a:srcRect/>
                       <a:stretch>
                         <a:fillRect/>
@@ -9434,8 +8158,8 @@
                     </p:blipFill>
                     <p:spPr bwMode="auto">
                       <a:xfrm>
-                        <a:off x="1157940" y="1143000"/>
-                        <a:ext cx="5993127" cy="1981200"/>
+                        <a:off x="1866440" y="1119188"/>
+                        <a:ext cx="6094413" cy="2030412"/>
                       </a:xfrm>
                       <a:prstGeom prst="rect">
                         <a:avLst/>
@@ -9467,20 +8191,20 @@
           <p:nvPr>
             <p:extLst>
               <p:ext uri="{D42A27DB-BD31-4B8C-83A1-F6EECF244321}">
-                <p14:modId xmlns:p14="http://schemas.microsoft.com/office/powerpoint/2010/main" val="2581200484"/>
+                <p14:modId xmlns:p14="http://schemas.microsoft.com/office/powerpoint/2010/main" val="3277404318"/>
               </p:ext>
             </p:extLst>
           </p:nvPr>
         </p:nvGraphicFramePr>
         <p:xfrm>
-          <a:off x="748410" y="3124619"/>
+          <a:off x="657690" y="3203999"/>
           <a:ext cx="7234698" cy="1879341"/>
         </p:xfrm>
         <a:graphic>
           <a:graphicData uri="http://schemas.openxmlformats.org/presentationml/2006/ole">
             <mc:AlternateContent xmlns:mc="http://schemas.openxmlformats.org/markup-compatibility/2006">
               <mc:Choice xmlns:v="urn:schemas-microsoft-com:vml" Requires="v">
-                <p:oleObj spid="_x0000_s200823" name="Equation" r:id="rId6" imgW="1955520" imgH="507960" progId="Equation.DSMT4">
+                <p:oleObj spid="_x0000_s200852" name="Equation" r:id="rId6" imgW="1955520" imgH="507960" progId="Equation.DSMT4">
                   <p:embed/>
                 </p:oleObj>
               </mc:Choice>
@@ -9510,7 +8234,7 @@
                     </p:blipFill>
                     <p:spPr bwMode="auto">
                       <a:xfrm>
-                        <a:off x="748410" y="3124619"/>
+                        <a:off x="657690" y="3203999"/>
                         <a:ext cx="7234698" cy="1879341"/>
                       </a:xfrm>
                       <a:prstGeom prst="rect">
@@ -9542,7 +8266,7 @@
           <a:graphicData uri="http://schemas.openxmlformats.org/presentationml/2006/ole">
             <mc:AlternateContent xmlns:mc="http://schemas.openxmlformats.org/markup-compatibility/2006">
               <mc:Choice xmlns:v="urn:schemas-microsoft-com:vml" Requires="v">
-                <p:oleObj spid="_x0000_s200824" name="Equation" r:id="rId8" imgW="863280" imgH="228600" progId="Equation.DSMT4">
+                <p:oleObj spid="_x0000_s200853" name="Equation" r:id="rId8" imgW="863280" imgH="228600" progId="Equation.DSMT4">
                   <p:embed/>
                 </p:oleObj>
               </mc:Choice>
@@ -9644,7 +8368,7 @@
               <a:pPr>
                 <a:defRPr/>
               </a:pPr>
-              <a:t>8</a:t>
+              <a:t>7</a:t>
             </a:fld>
             <a:endParaRPr lang="en-US" sz="1200" dirty="0">
               <a:latin typeface="Comic Sans MS"/>
@@ -9658,9 +8382,18 @@
   <p:clrMapOvr>
     <a:masterClrMapping/>
   </p:clrMapOvr>
-  <p:transition xmlns:p14="http://schemas.microsoft.com/office/powerpoint/2010/main" spd="slow">
-    <p:fade thruBlk="1"/>
-  </p:transition>
+  <mc:AlternateContent xmlns:mc="http://schemas.openxmlformats.org/markup-compatibility/2006" xmlns:p14="http://schemas.microsoft.com/office/powerpoint/2010/main">
+    <mc:Choice Requires="p14">
+      <p:transition spd="med" p14:dur="700" advClick="0">
+        <p:fade/>
+      </p:transition>
+    </mc:Choice>
+    <mc:Fallback xmlns="">
+      <p:transition xmlns:p14="http://schemas.microsoft.com/office/powerpoint/2010/main" spd="med" advClick="0">
+        <p:fade/>
+      </p:transition>
+    </mc:Fallback>
+  </mc:AlternateContent>
   <p:timing>
     <p:tnLst>
       <p:par>
@@ -9673,6 +8406,9 @@
                     <p:cTn id="3" fill="hold">
                       <p:stCondLst>
                         <p:cond delay="indefinite"/>
+                        <p:cond evt="onBegin" delay="0">
+                          <p:tn val="2"/>
+                        </p:cond>
                       </p:stCondLst>
                       <p:childTnLst>
                         <p:par>
@@ -9682,7 +8418,7 @@
                             </p:stCondLst>
                             <p:childTnLst>
                               <p:par>
-                                <p:cTn id="5" presetID="22" presetClass="entr" presetSubtype="8" fill="hold" nodeType="clickEffect">
+                                <p:cTn id="5" presetID="22" presetClass="entr" presetSubtype="8" fill="hold" nodeType="withEffect">
                                   <p:stCondLst>
                                     <p:cond delay="0"/>
                                   </p:stCondLst>
@@ -9853,6 +8589,249 @@
 </p:sld>
 </file>
 
+<file path=ppt/slides/slide8.xml><?xml version="1.0" encoding="utf-8"?>
+<p:sld xmlns:a="http://schemas.openxmlformats.org/drawingml/2006/main" xmlns:r="http://schemas.openxmlformats.org/officeDocument/2006/relationships" xmlns:p="http://schemas.openxmlformats.org/presentationml/2006/main">
+  <p:cSld>
+    <p:spTree>
+      <p:nvGrpSpPr>
+        <p:cNvPr id="1" name=""/>
+        <p:cNvGrpSpPr/>
+        <p:nvPr/>
+      </p:nvGrpSpPr>
+      <p:grpSpPr>
+        <a:xfrm>
+          <a:off x="0" y="0"/>
+          <a:ext cx="0" cy="0"/>
+          <a:chOff x="0" y="0"/>
+          <a:chExt cx="0" cy="0"/>
+        </a:xfrm>
+      </p:grpSpPr>
+      <p:graphicFrame>
+        <p:nvGraphicFramePr>
+          <p:cNvPr id="5" name="Object 4"/>
+          <p:cNvGraphicFramePr>
+            <a:graphicFrameLocks noChangeAspect="1"/>
+          </p:cNvGraphicFramePr>
+          <p:nvPr>
+            <p:extLst>
+              <p:ext uri="{D42A27DB-BD31-4B8C-83A1-F6EECF244321}">
+                <p14:modId xmlns:p14="http://schemas.microsoft.com/office/powerpoint/2010/main" val="2488590054"/>
+              </p:ext>
+            </p:extLst>
+          </p:nvPr>
+        </p:nvGraphicFramePr>
+        <p:xfrm>
+          <a:off x="1273175" y="1011238"/>
+          <a:ext cx="6557963" cy="1960562"/>
+        </p:xfrm>
+        <a:graphic>
+          <a:graphicData uri="http://schemas.openxmlformats.org/presentationml/2006/ole">
+            <mc:AlternateContent xmlns:mc="http://schemas.openxmlformats.org/markup-compatibility/2006">
+              <mc:Choice xmlns:v="urn:schemas-microsoft-com:vml" Requires="v">
+                <p:oleObj spid="_x0000_s202854" name="Equation" r:id="rId4" imgW="1739900" imgH="520700" progId="Equation.DSMT4">
+                  <p:embed/>
+                </p:oleObj>
+              </mc:Choice>
+              <mc:Fallback>
+                <p:oleObj name="Equation" r:id="rId4" imgW="1739900" imgH="520700" progId="Equation.DSMT4">
+                  <p:embed/>
+                  <p:pic>
+                    <p:nvPicPr>
+                      <p:cNvPr id="0" name="Object 2"/>
+                      <p:cNvPicPr>
+                        <a:picLocks noChangeAspect="1" noChangeArrowheads="1"/>
+                      </p:cNvPicPr>
+                      <p:nvPr/>
+                    </p:nvPicPr>
+                    <p:blipFill>
+                      <a:blip r:embed="rId5"/>
+                      <a:srcRect/>
+                      <a:stretch>
+                        <a:fillRect/>
+                      </a:stretch>
+                    </p:blipFill>
+                    <p:spPr bwMode="auto">
+                      <a:xfrm>
+                        <a:off x="1273175" y="1011238"/>
+                        <a:ext cx="6557963" cy="1960562"/>
+                      </a:xfrm>
+                      <a:prstGeom prst="rect">
+                        <a:avLst/>
+                      </a:prstGeom>
+                      <a:noFill/>
+                      <a:extLst/>
+                    </p:spPr>
+                  </p:pic>
+                </p:oleObj>
+              </mc:Fallback>
+            </mc:AlternateContent>
+          </a:graphicData>
+        </a:graphic>
+      </p:graphicFrame>
+      <p:sp>
+        <p:nvSpPr>
+          <p:cNvPr id="4" name="Rectangle 2"/>
+          <p:cNvSpPr>
+            <a:spLocks noGrp="1" noChangeArrowheads="1"/>
+          </p:cNvSpPr>
+          <p:nvPr>
+            <p:ph type="title"/>
+          </p:nvPr>
+        </p:nvSpPr>
+        <p:spPr/>
+        <p:txBody>
+          <a:bodyPr/>
+          <a:lstStyle/>
+          <a:p>
+            <a:pPr eaLnBrk="1" hangingPunct="1"/>
+            <a:r>
+              <a:rPr lang="en-US" sz="4400" dirty="0" smtClean="0">
+                <a:solidFill>
+                  <a:schemeClr val="tx1"/>
+                </a:solidFill>
+              </a:rPr>
+              <a:t>Binomial Expectation</a:t>
+            </a:r>
+          </a:p>
+        </p:txBody>
+      </p:sp>
+      <p:graphicFrame>
+        <p:nvGraphicFramePr>
+          <p:cNvPr id="148484" name="Object 4"/>
+          <p:cNvGraphicFramePr>
+            <a:graphicFrameLocks noChangeAspect="1"/>
+          </p:cNvGraphicFramePr>
+          <p:nvPr>
+            <p:extLst>
+              <p:ext uri="{D42A27DB-BD31-4B8C-83A1-F6EECF244321}">
+                <p14:modId xmlns:p14="http://schemas.microsoft.com/office/powerpoint/2010/main" val="3165245050"/>
+              </p:ext>
+            </p:extLst>
+          </p:nvPr>
+        </p:nvGraphicFramePr>
+        <p:xfrm>
+          <a:off x="625475" y="3057525"/>
+          <a:ext cx="7337425" cy="1978025"/>
+        </p:xfrm>
+        <a:graphic>
+          <a:graphicData uri="http://schemas.openxmlformats.org/presentationml/2006/ole">
+            <mc:AlternateContent xmlns:mc="http://schemas.openxmlformats.org/markup-compatibility/2006">
+              <mc:Choice xmlns:v="urn:schemas-microsoft-com:vml" Requires="v">
+                <p:oleObj spid="_x0000_s202855" name="Equation" r:id="rId6" imgW="1930400" imgH="520700" progId="Equation.DSMT4">
+                  <p:embed/>
+                </p:oleObj>
+              </mc:Choice>
+              <mc:Fallback>
+                <p:oleObj name="Equation" r:id="rId6" imgW="1930400" imgH="520700" progId="Equation.DSMT4">
+                  <p:embed/>
+                  <p:pic>
+                    <p:nvPicPr>
+                      <p:cNvPr id="0" name="Object 4"/>
+                      <p:cNvPicPr>
+                        <a:picLocks noChangeAspect="1" noChangeArrowheads="1"/>
+                      </p:cNvPicPr>
+                      <p:nvPr/>
+                    </p:nvPicPr>
+                    <p:blipFill>
+                      <a:blip r:embed="rId7"/>
+                      <a:srcRect/>
+                      <a:stretch>
+                        <a:fillRect/>
+                      </a:stretch>
+                    </p:blipFill>
+                    <p:spPr bwMode="auto">
+                      <a:xfrm>
+                        <a:off x="625475" y="3057525"/>
+                        <a:ext cx="7337425" cy="1978025"/>
+                      </a:xfrm>
+                      <a:prstGeom prst="rect">
+                        <a:avLst/>
+                      </a:prstGeom>
+                      <a:noFill/>
+                      <a:extLst/>
+                    </p:spPr>
+                  </p:pic>
+                </p:oleObj>
+              </mc:Fallback>
+            </mc:AlternateContent>
+          </a:graphicData>
+        </a:graphic>
+      </p:graphicFrame>
+      <p:sp>
+        <p:nvSpPr>
+          <p:cNvPr id="6" name="Slide Number Placeholder 3"/>
+          <p:cNvSpPr>
+            <a:spLocks noGrp="1"/>
+          </p:cNvSpPr>
+          <p:nvPr>
+            <p:ph type="sldNum" sz="quarter" idx="4294967295"/>
+          </p:nvPr>
+        </p:nvSpPr>
+        <p:spPr>
+          <a:xfrm>
+            <a:off x="7554913" y="6577965"/>
+            <a:ext cx="1527175" cy="244475"/>
+          </a:xfrm>
+          <a:prstGeom prst="rect">
+            <a:avLst/>
+          </a:prstGeom>
+        </p:spPr>
+        <p:txBody>
+          <a:bodyPr/>
+          <a:lstStyle/>
+          <a:p>
+            <a:pPr>
+              <a:defRPr/>
+            </a:pPr>
+            <a:r>
+              <a:rPr lang="en-US" sz="1200" dirty="0" err="1">
+                <a:latin typeface="Comic Sans MS"/>
+                <a:cs typeface="Comic Sans MS"/>
+              </a:rPr>
+              <a:t>lec</a:t>
+            </a:r>
+            <a:r>
+              <a:rPr lang="en-US" sz="1200" dirty="0" smtClean="0">
+                <a:latin typeface="Comic Sans MS"/>
+                <a:cs typeface="Comic Sans MS"/>
+              </a:rPr>
+              <a:t> 12F.</a:t>
+            </a:r>
+            <a:fld id="{93DA0692-DAF7-4AFE-9BE7-E02439D3694A}" type="slidenum">
+              <a:rPr lang="en-US" sz="1200" smtClean="0">
+                <a:latin typeface="Comic Sans MS"/>
+                <a:cs typeface="Comic Sans MS"/>
+              </a:rPr>
+              <a:pPr>
+                <a:defRPr/>
+              </a:pPr>
+              <a:t>8</a:t>
+            </a:fld>
+            <a:endParaRPr lang="en-US" sz="1200" dirty="0">
+              <a:latin typeface="Comic Sans MS"/>
+              <a:cs typeface="Comic Sans MS"/>
+            </a:endParaRPr>
+          </a:p>
+        </p:txBody>
+      </p:sp>
+    </p:spTree>
+  </p:cSld>
+  <p:clrMapOvr>
+    <a:masterClrMapping/>
+  </p:clrMapOvr>
+  <p:transition xmlns:p14="http://schemas.microsoft.com/office/powerpoint/2010/main" advClick="0">
+    <p:fade/>
+  </p:transition>
+  <p:timing>
+    <p:tnLst>
+      <p:par>
+        <p:cTn xmlns:p14="http://schemas.microsoft.com/office/powerpoint/2010/main" id="1" dur="indefinite" restart="never" nodeType="tmRoot"/>
+      </p:par>
+    </p:tnLst>
+  </p:timing>
+</p:sld>
+</file>
+
 <file path=ppt/slides/slide9.xml><?xml version="1.0" encoding="utf-8"?>
 <p:sld xmlns:a="http://schemas.openxmlformats.org/drawingml/2006/main" xmlns:r="http://schemas.openxmlformats.org/officeDocument/2006/relationships" xmlns:p="http://schemas.openxmlformats.org/presentationml/2006/main">
   <p:cSld>
@@ -9879,42 +8858,36 @@
           <p:nvPr>
             <p:extLst>
               <p:ext uri="{D42A27DB-BD31-4B8C-83A1-F6EECF244321}">
-                <p14:modId xmlns:p14="http://schemas.microsoft.com/office/powerpoint/2010/main" val="1310796487"/>
+                <p14:modId xmlns:p14="http://schemas.microsoft.com/office/powerpoint/2010/main" val="1127343651"/>
               </p:ext>
             </p:extLst>
           </p:nvPr>
         </p:nvGraphicFramePr>
         <p:xfrm>
-          <a:off x="1273140" y="1034579"/>
-          <a:ext cx="6557224" cy="1913883"/>
+          <a:off x="1273175" y="1000125"/>
+          <a:ext cx="6557963" cy="1960563"/>
         </p:xfrm>
         <a:graphic>
           <a:graphicData uri="http://schemas.openxmlformats.org/presentationml/2006/ole">
             <mc:AlternateContent xmlns:mc="http://schemas.openxmlformats.org/markup-compatibility/2006">
               <mc:Choice xmlns:v="urn:schemas-microsoft-com:vml" Requires="v">
-                <p:oleObj spid="_x0000_s202836" name="Equation" r:id="rId4" imgW="1739880" imgH="507960" progId="Equation.DSMT4">
+                <p:oleObj spid="_x0000_s583735" name="Equation" r:id="rId4" imgW="1739900" imgH="520700" progId="Equation.DSMT4">
                   <p:embed/>
                 </p:oleObj>
               </mc:Choice>
               <mc:Fallback>
-                <p:oleObj name="Equation" r:id="rId4" imgW="1739880" imgH="507960" progId="Equation.DSMT4">
+                <p:oleObj name="Equation" r:id="rId4" imgW="1739900" imgH="520700" progId="Equation.DSMT4">
                   <p:embed/>
                   <p:pic>
                     <p:nvPicPr>
-                      <p:cNvPr id="0" name="Object 2"/>
+                      <p:cNvPr id="0" name=""/>
                       <p:cNvPicPr>
                         <a:picLocks noChangeAspect="1" noChangeArrowheads="1"/>
                       </p:cNvPicPr>
                       <p:nvPr/>
                     </p:nvPicPr>
                     <p:blipFill>
-                      <a:blip r:embed="rId5">
-                        <a:extLst>
-                          <a:ext uri="{28A0092B-C50C-407E-A947-70E740481C1C}">
-                            <a14:useLocalDpi xmlns:a14="http://schemas.microsoft.com/office/drawing/2010/main" val="0"/>
-                          </a:ext>
-                        </a:extLst>
-                      </a:blip>
+                      <a:blip r:embed="rId5"/>
                       <a:srcRect/>
                       <a:stretch>
                         <a:fillRect/>
@@ -9922,8 +8895,8 @@
                     </p:blipFill>
                     <p:spPr bwMode="auto">
                       <a:xfrm>
-                        <a:off x="1273140" y="1034579"/>
-                        <a:ext cx="6557224" cy="1913883"/>
+                        <a:off x="1273175" y="1000125"/>
+                        <a:ext cx="6557963" cy="1960563"/>
                       </a:xfrm>
                       <a:prstGeom prst="rect">
                         <a:avLst/>
@@ -9974,42 +8947,36 @@
           <p:nvPr>
             <p:extLst>
               <p:ext uri="{D42A27DB-BD31-4B8C-83A1-F6EECF244321}">
-                <p14:modId xmlns:p14="http://schemas.microsoft.com/office/powerpoint/2010/main" val="995347492"/>
+                <p14:modId xmlns:p14="http://schemas.microsoft.com/office/powerpoint/2010/main" val="3044962673"/>
               </p:ext>
             </p:extLst>
           </p:nvPr>
         </p:nvGraphicFramePr>
         <p:xfrm>
-          <a:off x="577790" y="3081118"/>
-          <a:ext cx="7434586" cy="1931265"/>
+          <a:off x="757470" y="3045715"/>
+          <a:ext cx="7096125" cy="1979613"/>
         </p:xfrm>
         <a:graphic>
           <a:graphicData uri="http://schemas.openxmlformats.org/presentationml/2006/ole">
             <mc:AlternateContent xmlns:mc="http://schemas.openxmlformats.org/markup-compatibility/2006">
               <mc:Choice xmlns:v="urn:schemas-microsoft-com:vml" Requires="v">
-                <p:oleObj spid="_x0000_s202837" name="Equation" r:id="rId6" imgW="1955520" imgH="507960" progId="Equation.DSMT4">
+                <p:oleObj spid="_x0000_s583736" name="Equation" r:id="rId6" imgW="1866900" imgH="520700" progId="Equation.DSMT4">
                   <p:embed/>
                 </p:oleObj>
               </mc:Choice>
               <mc:Fallback>
-                <p:oleObj name="Equation" r:id="rId6" imgW="1955520" imgH="507960" progId="Equation.DSMT4">
+                <p:oleObj name="Equation" r:id="rId6" imgW="1866900" imgH="520700" progId="Equation.DSMT4">
                   <p:embed/>
                   <p:pic>
                     <p:nvPicPr>
-                      <p:cNvPr id="0" name="Object 4"/>
+                      <p:cNvPr id="0" name=""/>
                       <p:cNvPicPr>
                         <a:picLocks noChangeAspect="1" noChangeArrowheads="1"/>
                       </p:cNvPicPr>
                       <p:nvPr/>
                     </p:nvPicPr>
                     <p:blipFill>
-                      <a:blip r:embed="rId7">
-                        <a:extLst>
-                          <a:ext uri="{28A0092B-C50C-407E-A947-70E740481C1C}">
-                            <a14:useLocalDpi xmlns:a14="http://schemas.microsoft.com/office/drawing/2010/main" val="0"/>
-                          </a:ext>
-                        </a:extLst>
-                      </a:blip>
+                      <a:blip r:embed="rId7"/>
                       <a:srcRect/>
                       <a:stretch>
                         <a:fillRect/>
@@ -10017,8 +8984,8 @@
                     </p:blipFill>
                     <p:spPr bwMode="auto">
                       <a:xfrm>
-                        <a:off x="577790" y="3081118"/>
-                        <a:ext cx="7434586" cy="1931265"/>
+                        <a:off x="757470" y="3045715"/>
+                        <a:ext cx="7096125" cy="1979613"/>
                       </a:xfrm>
                       <a:prstGeom prst="rect">
                         <a:avLst/>
@@ -10091,11 +9058,16 @@
         </p:txBody>
       </p:sp>
     </p:spTree>
+    <p:extLst>
+      <p:ext uri="{BB962C8B-B14F-4D97-AF65-F5344CB8AC3E}">
+        <p14:creationId xmlns:p14="http://schemas.microsoft.com/office/powerpoint/2010/main" val="1450720977"/>
+      </p:ext>
+    </p:extLst>
   </p:cSld>
   <p:clrMapOvr>
     <a:masterClrMapping/>
   </p:clrMapOvr>
-  <p:transition xmlns:p14="http://schemas.microsoft.com/office/powerpoint/2010/main" advClick="0">
+  <p:transition xmlns:p14="http://schemas.microsoft.com/office/powerpoint/2010/main">
     <p:fade/>
   </p:transition>
   <p:timing>

</xml_diff>